<commit_message>
benchmarking missing and presentation almost done
</commit_message>
<xml_diff>
--- a/Presentation/Final Presentation.pptx
+++ b/Presentation/Final Presentation.pptx
@@ -5,25 +5,27 @@
     <p:sldMasterId id="2147483648" r:id="rId1"/>
   </p:sldMasterIdLst>
   <p:notesMasterIdLst>
-    <p:notesMasterId r:id="rId18"/>
+    <p:notesMasterId r:id="rId20"/>
   </p:notesMasterIdLst>
   <p:sldIdLst>
     <p:sldId id="256" r:id="rId2"/>
     <p:sldId id="261" r:id="rId3"/>
-    <p:sldId id="259" r:id="rId4"/>
+    <p:sldId id="277" r:id="rId4"/>
     <p:sldId id="260" r:id="rId5"/>
-    <p:sldId id="262" r:id="rId6"/>
-    <p:sldId id="263" r:id="rId7"/>
-    <p:sldId id="269" r:id="rId8"/>
-    <p:sldId id="272" r:id="rId9"/>
-    <p:sldId id="265" r:id="rId10"/>
-    <p:sldId id="267" r:id="rId11"/>
-    <p:sldId id="270" r:id="rId12"/>
-    <p:sldId id="268" r:id="rId13"/>
-    <p:sldId id="271" r:id="rId14"/>
-    <p:sldId id="275" r:id="rId15"/>
-    <p:sldId id="274" r:id="rId16"/>
-    <p:sldId id="258" r:id="rId17"/>
+    <p:sldId id="281" r:id="rId6"/>
+    <p:sldId id="276" r:id="rId7"/>
+    <p:sldId id="278" r:id="rId8"/>
+    <p:sldId id="279" r:id="rId9"/>
+    <p:sldId id="280" r:id="rId10"/>
+    <p:sldId id="270" r:id="rId11"/>
+    <p:sldId id="262" r:id="rId12"/>
+    <p:sldId id="272" r:id="rId13"/>
+    <p:sldId id="265" r:id="rId14"/>
+    <p:sldId id="267" r:id="rId15"/>
+    <p:sldId id="268" r:id="rId16"/>
+    <p:sldId id="275" r:id="rId17"/>
+    <p:sldId id="274" r:id="rId18"/>
+    <p:sldId id="258" r:id="rId19"/>
   </p:sldIdLst>
   <p:sldSz cx="12192000" cy="6858000"/>
   <p:notesSz cx="6858000" cy="9144000"/>
@@ -215,7 +217,7 @@
           <a:p>
             <a:fld id="{4214EAB5-E09C-2143-976E-A916457BEE18}" type="datetimeFigureOut">
               <a:rPr lang="en-US" smtClean="0"/>
-              <a:t>2/6/22</a:t>
+              <a:t>2/14/22</a:t>
             </a:fld>
             <a:endParaRPr lang="en-US" dirty="0"/>
           </a:p>
@@ -558,6 +560,525 @@
     <p:extLst>
       <p:ext uri="{BB962C8B-B14F-4D97-AF65-F5344CB8AC3E}">
         <p14:creationId xmlns:p14="http://schemas.microsoft.com/office/powerpoint/2010/main" val="3053500214"/>
+      </p:ext>
+    </p:extLst>
+  </p:cSld>
+  <p:clrMapOvr>
+    <a:masterClrMapping/>
+  </p:clrMapOvr>
+</p:notes>
+</file>
+
+<file path=ppt/notesSlides/notesSlide2.xml><?xml version="1.0" encoding="utf-8"?>
+<p:notes xmlns:a="http://schemas.openxmlformats.org/drawingml/2006/main" xmlns:r="http://schemas.openxmlformats.org/officeDocument/2006/relationships" xmlns:p="http://schemas.openxmlformats.org/presentationml/2006/main">
+  <p:cSld>
+    <p:spTree>
+      <p:nvGrpSpPr>
+        <p:cNvPr id="1" name=""/>
+        <p:cNvGrpSpPr/>
+        <p:nvPr/>
+      </p:nvGrpSpPr>
+      <p:grpSpPr>
+        <a:xfrm>
+          <a:off x="0" y="0"/>
+          <a:ext cx="0" cy="0"/>
+          <a:chOff x="0" y="0"/>
+          <a:chExt cx="0" cy="0"/>
+        </a:xfrm>
+      </p:grpSpPr>
+      <p:sp>
+        <p:nvSpPr>
+          <p:cNvPr id="2" name="Segnaposto immagine diapositiva 1"/>
+          <p:cNvSpPr>
+            <a:spLocks noGrp="1" noRot="1" noChangeAspect="1"/>
+          </p:cNvSpPr>
+          <p:nvPr>
+            <p:ph type="sldImg"/>
+          </p:nvPr>
+        </p:nvSpPr>
+        <p:spPr/>
+      </p:sp>
+      <p:sp>
+        <p:nvSpPr>
+          <p:cNvPr id="3" name="Segnaposto note 2"/>
+          <p:cNvSpPr>
+            <a:spLocks noGrp="1"/>
+          </p:cNvSpPr>
+          <p:nvPr>
+            <p:ph type="body" idx="1"/>
+          </p:nvPr>
+        </p:nvSpPr>
+        <p:spPr/>
+        <p:txBody>
+          <a:bodyPr/>
+          <a:lstStyle/>
+          <a:p>
+            <a:r>
+              <a:rPr lang="en-GB" dirty="0"/>
+              <a:t>Project work</a:t>
+            </a:r>
+          </a:p>
+        </p:txBody>
+      </p:sp>
+      <p:sp>
+        <p:nvSpPr>
+          <p:cNvPr id="4" name="Segnaposto numero diapositiva 3"/>
+          <p:cNvSpPr>
+            <a:spLocks noGrp="1"/>
+          </p:cNvSpPr>
+          <p:nvPr>
+            <p:ph type="sldNum" sz="quarter" idx="5"/>
+          </p:nvPr>
+        </p:nvSpPr>
+        <p:spPr/>
+        <p:txBody>
+          <a:bodyPr/>
+          <a:lstStyle/>
+          <a:p>
+            <a:fld id="{DFFD0D0F-EBF2-8348-B016-224B91737C44}" type="slidenum">
+              <a:rPr lang="en-US" smtClean="0"/>
+              <a:t>5</a:t>
+            </a:fld>
+            <a:endParaRPr lang="en-US" dirty="0"/>
+          </a:p>
+        </p:txBody>
+      </p:sp>
+    </p:spTree>
+    <p:extLst>
+      <p:ext uri="{BB962C8B-B14F-4D97-AF65-F5344CB8AC3E}">
+        <p14:creationId xmlns:p14="http://schemas.microsoft.com/office/powerpoint/2010/main" val="612682206"/>
+      </p:ext>
+    </p:extLst>
+  </p:cSld>
+  <p:clrMapOvr>
+    <a:masterClrMapping/>
+  </p:clrMapOvr>
+</p:notes>
+</file>
+
+<file path=ppt/notesSlides/notesSlide3.xml><?xml version="1.0" encoding="utf-8"?>
+<p:notes xmlns:a="http://schemas.openxmlformats.org/drawingml/2006/main" xmlns:r="http://schemas.openxmlformats.org/officeDocument/2006/relationships" xmlns:p="http://schemas.openxmlformats.org/presentationml/2006/main">
+  <p:cSld>
+    <p:spTree>
+      <p:nvGrpSpPr>
+        <p:cNvPr id="1" name=""/>
+        <p:cNvGrpSpPr/>
+        <p:nvPr/>
+      </p:nvGrpSpPr>
+      <p:grpSpPr>
+        <a:xfrm>
+          <a:off x="0" y="0"/>
+          <a:ext cx="0" cy="0"/>
+          <a:chOff x="0" y="0"/>
+          <a:chExt cx="0" cy="0"/>
+        </a:xfrm>
+      </p:grpSpPr>
+      <p:sp>
+        <p:nvSpPr>
+          <p:cNvPr id="2" name="Segnaposto immagine diapositiva 1"/>
+          <p:cNvSpPr>
+            <a:spLocks noGrp="1" noRot="1" noChangeAspect="1"/>
+          </p:cNvSpPr>
+          <p:nvPr>
+            <p:ph type="sldImg"/>
+          </p:nvPr>
+        </p:nvSpPr>
+        <p:spPr/>
+      </p:sp>
+      <p:sp>
+        <p:nvSpPr>
+          <p:cNvPr id="3" name="Segnaposto note 2"/>
+          <p:cNvSpPr>
+            <a:spLocks noGrp="1"/>
+          </p:cNvSpPr>
+          <p:nvPr>
+            <p:ph type="body" idx="1"/>
+          </p:nvPr>
+        </p:nvSpPr>
+        <p:spPr/>
+        <p:txBody>
+          <a:bodyPr/>
+          <a:lstStyle/>
+          <a:p>
+            <a:r>
+              <a:rPr lang="en-GB" dirty="0"/>
+              <a:t>Project work</a:t>
+            </a:r>
+          </a:p>
+        </p:txBody>
+      </p:sp>
+      <p:sp>
+        <p:nvSpPr>
+          <p:cNvPr id="4" name="Segnaposto numero diapositiva 3"/>
+          <p:cNvSpPr>
+            <a:spLocks noGrp="1"/>
+          </p:cNvSpPr>
+          <p:nvPr>
+            <p:ph type="sldNum" sz="quarter" idx="5"/>
+          </p:nvPr>
+        </p:nvSpPr>
+        <p:spPr/>
+        <p:txBody>
+          <a:bodyPr/>
+          <a:lstStyle/>
+          <a:p>
+            <a:fld id="{DFFD0D0F-EBF2-8348-B016-224B91737C44}" type="slidenum">
+              <a:rPr lang="en-US" smtClean="0"/>
+              <a:t>6</a:t>
+            </a:fld>
+            <a:endParaRPr lang="en-US" dirty="0"/>
+          </a:p>
+        </p:txBody>
+      </p:sp>
+    </p:spTree>
+    <p:extLst>
+      <p:ext uri="{BB962C8B-B14F-4D97-AF65-F5344CB8AC3E}">
+        <p14:creationId xmlns:p14="http://schemas.microsoft.com/office/powerpoint/2010/main" val="1729221698"/>
+      </p:ext>
+    </p:extLst>
+  </p:cSld>
+  <p:clrMapOvr>
+    <a:masterClrMapping/>
+  </p:clrMapOvr>
+</p:notes>
+</file>
+
+<file path=ppt/notesSlides/notesSlide4.xml><?xml version="1.0" encoding="utf-8"?>
+<p:notes xmlns:a="http://schemas.openxmlformats.org/drawingml/2006/main" xmlns:r="http://schemas.openxmlformats.org/officeDocument/2006/relationships" xmlns:p="http://schemas.openxmlformats.org/presentationml/2006/main">
+  <p:cSld>
+    <p:spTree>
+      <p:nvGrpSpPr>
+        <p:cNvPr id="1" name=""/>
+        <p:cNvGrpSpPr/>
+        <p:nvPr/>
+      </p:nvGrpSpPr>
+      <p:grpSpPr>
+        <a:xfrm>
+          <a:off x="0" y="0"/>
+          <a:ext cx="0" cy="0"/>
+          <a:chOff x="0" y="0"/>
+          <a:chExt cx="0" cy="0"/>
+        </a:xfrm>
+      </p:grpSpPr>
+      <p:sp>
+        <p:nvSpPr>
+          <p:cNvPr id="2" name="Segnaposto immagine diapositiva 1"/>
+          <p:cNvSpPr>
+            <a:spLocks noGrp="1" noRot="1" noChangeAspect="1"/>
+          </p:cNvSpPr>
+          <p:nvPr>
+            <p:ph type="sldImg"/>
+          </p:nvPr>
+        </p:nvSpPr>
+        <p:spPr/>
+      </p:sp>
+      <p:sp>
+        <p:nvSpPr>
+          <p:cNvPr id="3" name="Segnaposto note 2"/>
+          <p:cNvSpPr>
+            <a:spLocks noGrp="1"/>
+          </p:cNvSpPr>
+          <p:nvPr>
+            <p:ph type="body" idx="1"/>
+          </p:nvPr>
+        </p:nvSpPr>
+        <p:spPr/>
+        <p:txBody>
+          <a:bodyPr/>
+          <a:lstStyle/>
+          <a:p>
+            <a:r>
+              <a:rPr lang="en-GB" dirty="0"/>
+              <a:t>Project work</a:t>
+            </a:r>
+          </a:p>
+        </p:txBody>
+      </p:sp>
+      <p:sp>
+        <p:nvSpPr>
+          <p:cNvPr id="4" name="Segnaposto numero diapositiva 3"/>
+          <p:cNvSpPr>
+            <a:spLocks noGrp="1"/>
+          </p:cNvSpPr>
+          <p:nvPr>
+            <p:ph type="sldNum" sz="quarter" idx="5"/>
+          </p:nvPr>
+        </p:nvSpPr>
+        <p:spPr/>
+        <p:txBody>
+          <a:bodyPr/>
+          <a:lstStyle/>
+          <a:p>
+            <a:fld id="{DFFD0D0F-EBF2-8348-B016-224B91737C44}" type="slidenum">
+              <a:rPr lang="en-US" smtClean="0"/>
+              <a:t>7</a:t>
+            </a:fld>
+            <a:endParaRPr lang="en-US" dirty="0"/>
+          </a:p>
+        </p:txBody>
+      </p:sp>
+    </p:spTree>
+    <p:extLst>
+      <p:ext uri="{BB962C8B-B14F-4D97-AF65-F5344CB8AC3E}">
+        <p14:creationId xmlns:p14="http://schemas.microsoft.com/office/powerpoint/2010/main" val="1086613429"/>
+      </p:ext>
+    </p:extLst>
+  </p:cSld>
+  <p:clrMapOvr>
+    <a:masterClrMapping/>
+  </p:clrMapOvr>
+</p:notes>
+</file>
+
+<file path=ppt/notesSlides/notesSlide5.xml><?xml version="1.0" encoding="utf-8"?>
+<p:notes xmlns:a="http://schemas.openxmlformats.org/drawingml/2006/main" xmlns:r="http://schemas.openxmlformats.org/officeDocument/2006/relationships" xmlns:p="http://schemas.openxmlformats.org/presentationml/2006/main">
+  <p:cSld>
+    <p:spTree>
+      <p:nvGrpSpPr>
+        <p:cNvPr id="1" name=""/>
+        <p:cNvGrpSpPr/>
+        <p:nvPr/>
+      </p:nvGrpSpPr>
+      <p:grpSpPr>
+        <a:xfrm>
+          <a:off x="0" y="0"/>
+          <a:ext cx="0" cy="0"/>
+          <a:chOff x="0" y="0"/>
+          <a:chExt cx="0" cy="0"/>
+        </a:xfrm>
+      </p:grpSpPr>
+      <p:sp>
+        <p:nvSpPr>
+          <p:cNvPr id="2" name="Segnaposto immagine diapositiva 1"/>
+          <p:cNvSpPr>
+            <a:spLocks noGrp="1" noRot="1" noChangeAspect="1"/>
+          </p:cNvSpPr>
+          <p:nvPr>
+            <p:ph type="sldImg"/>
+          </p:nvPr>
+        </p:nvSpPr>
+        <p:spPr/>
+      </p:sp>
+      <p:sp>
+        <p:nvSpPr>
+          <p:cNvPr id="3" name="Segnaposto note 2"/>
+          <p:cNvSpPr>
+            <a:spLocks noGrp="1"/>
+          </p:cNvSpPr>
+          <p:nvPr>
+            <p:ph type="body" idx="1"/>
+          </p:nvPr>
+        </p:nvSpPr>
+        <p:spPr/>
+        <p:txBody>
+          <a:bodyPr/>
+          <a:lstStyle/>
+          <a:p>
+            <a:r>
+              <a:rPr lang="en-GB" dirty="0"/>
+              <a:t>Project work</a:t>
+            </a:r>
+          </a:p>
+        </p:txBody>
+      </p:sp>
+      <p:sp>
+        <p:nvSpPr>
+          <p:cNvPr id="4" name="Segnaposto numero diapositiva 3"/>
+          <p:cNvSpPr>
+            <a:spLocks noGrp="1"/>
+          </p:cNvSpPr>
+          <p:nvPr>
+            <p:ph type="sldNum" sz="quarter" idx="5"/>
+          </p:nvPr>
+        </p:nvSpPr>
+        <p:spPr/>
+        <p:txBody>
+          <a:bodyPr/>
+          <a:lstStyle/>
+          <a:p>
+            <a:fld id="{DFFD0D0F-EBF2-8348-B016-224B91737C44}" type="slidenum">
+              <a:rPr lang="en-US" smtClean="0"/>
+              <a:t>8</a:t>
+            </a:fld>
+            <a:endParaRPr lang="en-US" dirty="0"/>
+          </a:p>
+        </p:txBody>
+      </p:sp>
+    </p:spTree>
+    <p:extLst>
+      <p:ext uri="{BB962C8B-B14F-4D97-AF65-F5344CB8AC3E}">
+        <p14:creationId xmlns:p14="http://schemas.microsoft.com/office/powerpoint/2010/main" val="513415904"/>
+      </p:ext>
+    </p:extLst>
+  </p:cSld>
+  <p:clrMapOvr>
+    <a:masterClrMapping/>
+  </p:clrMapOvr>
+</p:notes>
+</file>
+
+<file path=ppt/notesSlides/notesSlide6.xml><?xml version="1.0" encoding="utf-8"?>
+<p:notes xmlns:a="http://schemas.openxmlformats.org/drawingml/2006/main" xmlns:r="http://schemas.openxmlformats.org/officeDocument/2006/relationships" xmlns:p="http://schemas.openxmlformats.org/presentationml/2006/main">
+  <p:cSld>
+    <p:spTree>
+      <p:nvGrpSpPr>
+        <p:cNvPr id="1" name=""/>
+        <p:cNvGrpSpPr/>
+        <p:nvPr/>
+      </p:nvGrpSpPr>
+      <p:grpSpPr>
+        <a:xfrm>
+          <a:off x="0" y="0"/>
+          <a:ext cx="0" cy="0"/>
+          <a:chOff x="0" y="0"/>
+          <a:chExt cx="0" cy="0"/>
+        </a:xfrm>
+      </p:grpSpPr>
+      <p:sp>
+        <p:nvSpPr>
+          <p:cNvPr id="2" name="Segnaposto immagine diapositiva 1"/>
+          <p:cNvSpPr>
+            <a:spLocks noGrp="1" noRot="1" noChangeAspect="1"/>
+          </p:cNvSpPr>
+          <p:nvPr>
+            <p:ph type="sldImg"/>
+          </p:nvPr>
+        </p:nvSpPr>
+        <p:spPr/>
+      </p:sp>
+      <p:sp>
+        <p:nvSpPr>
+          <p:cNvPr id="3" name="Segnaposto note 2"/>
+          <p:cNvSpPr>
+            <a:spLocks noGrp="1"/>
+          </p:cNvSpPr>
+          <p:nvPr>
+            <p:ph type="body" idx="1"/>
+          </p:nvPr>
+        </p:nvSpPr>
+        <p:spPr/>
+        <p:txBody>
+          <a:bodyPr/>
+          <a:lstStyle/>
+          <a:p>
+            <a:r>
+              <a:rPr lang="en-GB" dirty="0"/>
+              <a:t>Project work</a:t>
+            </a:r>
+          </a:p>
+        </p:txBody>
+      </p:sp>
+      <p:sp>
+        <p:nvSpPr>
+          <p:cNvPr id="4" name="Segnaposto numero diapositiva 3"/>
+          <p:cNvSpPr>
+            <a:spLocks noGrp="1"/>
+          </p:cNvSpPr>
+          <p:nvPr>
+            <p:ph type="sldNum" sz="quarter" idx="5"/>
+          </p:nvPr>
+        </p:nvSpPr>
+        <p:spPr/>
+        <p:txBody>
+          <a:bodyPr/>
+          <a:lstStyle/>
+          <a:p>
+            <a:fld id="{DFFD0D0F-EBF2-8348-B016-224B91737C44}" type="slidenum">
+              <a:rPr lang="en-US" smtClean="0"/>
+              <a:t>9</a:t>
+            </a:fld>
+            <a:endParaRPr lang="en-US" dirty="0"/>
+          </a:p>
+        </p:txBody>
+      </p:sp>
+    </p:spTree>
+    <p:extLst>
+      <p:ext uri="{BB962C8B-B14F-4D97-AF65-F5344CB8AC3E}">
+        <p14:creationId xmlns:p14="http://schemas.microsoft.com/office/powerpoint/2010/main" val="2206772460"/>
+      </p:ext>
+    </p:extLst>
+  </p:cSld>
+  <p:clrMapOvr>
+    <a:masterClrMapping/>
+  </p:clrMapOvr>
+</p:notes>
+</file>
+
+<file path=ppt/notesSlides/notesSlide7.xml><?xml version="1.0" encoding="utf-8"?>
+<p:notes xmlns:a="http://schemas.openxmlformats.org/drawingml/2006/main" xmlns:r="http://schemas.openxmlformats.org/officeDocument/2006/relationships" xmlns:p="http://schemas.openxmlformats.org/presentationml/2006/main">
+  <p:cSld>
+    <p:spTree>
+      <p:nvGrpSpPr>
+        <p:cNvPr id="1" name=""/>
+        <p:cNvGrpSpPr/>
+        <p:nvPr/>
+      </p:nvGrpSpPr>
+      <p:grpSpPr>
+        <a:xfrm>
+          <a:off x="0" y="0"/>
+          <a:ext cx="0" cy="0"/>
+          <a:chOff x="0" y="0"/>
+          <a:chExt cx="0" cy="0"/>
+        </a:xfrm>
+      </p:grpSpPr>
+      <p:sp>
+        <p:nvSpPr>
+          <p:cNvPr id="2" name="Segnaposto immagine diapositiva 1"/>
+          <p:cNvSpPr>
+            <a:spLocks noGrp="1" noRot="1" noChangeAspect="1"/>
+          </p:cNvSpPr>
+          <p:nvPr>
+            <p:ph type="sldImg"/>
+          </p:nvPr>
+        </p:nvSpPr>
+        <p:spPr/>
+      </p:sp>
+      <p:sp>
+        <p:nvSpPr>
+          <p:cNvPr id="3" name="Segnaposto note 2"/>
+          <p:cNvSpPr>
+            <a:spLocks noGrp="1"/>
+          </p:cNvSpPr>
+          <p:nvPr>
+            <p:ph type="body" idx="1"/>
+          </p:nvPr>
+        </p:nvSpPr>
+        <p:spPr/>
+        <p:txBody>
+          <a:bodyPr/>
+          <a:lstStyle/>
+          <a:p>
+            <a:endParaRPr lang="en-GB" dirty="0"/>
+          </a:p>
+        </p:txBody>
+      </p:sp>
+      <p:sp>
+        <p:nvSpPr>
+          <p:cNvPr id="4" name="Segnaposto numero diapositiva 3"/>
+          <p:cNvSpPr>
+            <a:spLocks noGrp="1"/>
+          </p:cNvSpPr>
+          <p:nvPr>
+            <p:ph type="sldNum" sz="quarter" idx="5"/>
+          </p:nvPr>
+        </p:nvSpPr>
+        <p:spPr/>
+        <p:txBody>
+          <a:bodyPr/>
+          <a:lstStyle/>
+          <a:p>
+            <a:fld id="{DFFD0D0F-EBF2-8348-B016-224B91737C44}" type="slidenum">
+              <a:rPr lang="en-US" smtClean="0"/>
+              <a:t>10</a:t>
+            </a:fld>
+            <a:endParaRPr lang="en-US" dirty="0"/>
+          </a:p>
+        </p:txBody>
+      </p:sp>
+    </p:spTree>
+    <p:extLst>
+      <p:ext uri="{BB962C8B-B14F-4D97-AF65-F5344CB8AC3E}">
+        <p14:creationId xmlns:p14="http://schemas.microsoft.com/office/powerpoint/2010/main" val="3312487452"/>
       </p:ext>
     </p:extLst>
   </p:cSld>
@@ -1873,6 +2394,13 @@
           </a:p>
           <a:p>
             <a:pPr algn="r"/>
+            <a:r>
+              <a:rPr lang="en-US" dirty="0"/>
+              <a:t>Bachelor thesis and Project Work</a:t>
+            </a:r>
+          </a:p>
+          <a:p>
+            <a:pPr algn="r"/>
             <a:endParaRPr lang="en-US" dirty="0"/>
           </a:p>
         </p:txBody>
@@ -1976,10 +2504,115 @@
       </p:grpSpPr>
       <p:sp>
         <p:nvSpPr>
+          <p:cNvPr id="2" name="Titolo 1">
+            <a:extLst>
+              <a:ext uri="{FF2B5EF4-FFF2-40B4-BE49-F238E27FC236}">
+                <a16:creationId xmlns:a16="http://schemas.microsoft.com/office/drawing/2014/main" id="{F1E6ECD5-EA9A-094D-BEF4-2616095B02D7}"/>
+              </a:ext>
+            </a:extLst>
+          </p:cNvPr>
+          <p:cNvSpPr>
+            <a:spLocks noGrp="1"/>
+          </p:cNvSpPr>
+          <p:nvPr>
+            <p:ph type="title"/>
+          </p:nvPr>
+        </p:nvSpPr>
+        <p:spPr/>
+        <p:txBody>
+          <a:bodyPr/>
+          <a:lstStyle/>
+          <a:p>
+            <a:r>
+              <a:rPr lang="en-GB" dirty="0"/>
+              <a:t>What do we want to know?</a:t>
+            </a:r>
+          </a:p>
+        </p:txBody>
+      </p:sp>
+      <p:sp>
+        <p:nvSpPr>
+          <p:cNvPr id="3" name="Segnaposto contenuto 2">
+            <a:extLst>
+              <a:ext uri="{FF2B5EF4-FFF2-40B4-BE49-F238E27FC236}">
+                <a16:creationId xmlns:a16="http://schemas.microsoft.com/office/drawing/2014/main" id="{056F26CA-B752-0B45-8476-A8E2EA946D64}"/>
+              </a:ext>
+            </a:extLst>
+          </p:cNvPr>
+          <p:cNvSpPr>
+            <a:spLocks noGrp="1"/>
+          </p:cNvSpPr>
+          <p:nvPr>
+            <p:ph idx="1"/>
+          </p:nvPr>
+        </p:nvSpPr>
+        <p:spPr/>
+        <p:txBody>
+          <a:bodyPr/>
+          <a:lstStyle/>
+          <a:p>
+            <a:pPr>
+              <a:lnSpc>
+                <a:spcPct val="150000"/>
+              </a:lnSpc>
+            </a:pPr>
+            <a:r>
+              <a:rPr lang="en-GB" dirty="0"/>
+              <a:t>Is the inference time related to the NNs structure?</a:t>
+            </a:r>
+          </a:p>
+          <a:p>
+            <a:pPr>
+              <a:lnSpc>
+                <a:spcPct val="150000"/>
+              </a:lnSpc>
+            </a:pPr>
+            <a:r>
+              <a:rPr lang="en-GB" dirty="0"/>
+              <a:t>Is inference time related to training time?</a:t>
+            </a:r>
+          </a:p>
+          <a:p>
+            <a:pPr>
+              <a:lnSpc>
+                <a:spcPct val="150000"/>
+              </a:lnSpc>
+            </a:pPr>
+            <a:r>
+              <a:rPr lang="en-GB" dirty="0"/>
+              <a:t>Is inference time related to accuracy?</a:t>
+            </a:r>
+          </a:p>
+          <a:p>
+            <a:pPr>
+              <a:lnSpc>
+                <a:spcPct val="150000"/>
+              </a:lnSpc>
+            </a:pPr>
+            <a:r>
+              <a:rPr lang="en-GB" dirty="0"/>
+              <a:t>Is inference time influenced by the attributes of the images? If so, do bigger images require more time to be processed?</a:t>
+            </a:r>
+          </a:p>
+          <a:p>
+            <a:pPr>
+              <a:lnSpc>
+                <a:spcPct val="150000"/>
+              </a:lnSpc>
+            </a:pPr>
+            <a:endParaRPr lang="en-GB" dirty="0"/>
+          </a:p>
+          <a:p>
+            <a:endParaRPr lang="en-GB" dirty="0"/>
+          </a:p>
+        </p:txBody>
+      </p:sp>
+      <p:sp>
+        <p:nvSpPr>
           <p:cNvPr id="4" name="Segnaposto numero diapositiva 3">
             <a:extLst>
               <a:ext uri="{FF2B5EF4-FFF2-40B4-BE49-F238E27FC236}">
-                <a16:creationId xmlns:a16="http://schemas.microsoft.com/office/drawing/2014/main" id="{9BE5D24F-6D41-A040-8563-C9375B8CC2A7}"/>
+                <a16:creationId xmlns:a16="http://schemas.microsoft.com/office/drawing/2014/main" id="{55EFB383-C2EC-3F41-9DF1-09CE7AEF27E9}"/>
               </a:ext>
             </a:extLst>
           </p:cNvPr>
@@ -1999,6 +2632,654 @@
               <a:rPr lang="en-US" smtClean="0"/>
               <a:pPr/>
               <a:t>10</a:t>
+            </a:fld>
+            <a:endParaRPr lang="en-US" dirty="0"/>
+          </a:p>
+        </p:txBody>
+      </p:sp>
+      <p:sp>
+        <p:nvSpPr>
+          <p:cNvPr id="5" name="Segnaposto data 4">
+            <a:extLst>
+              <a:ext uri="{FF2B5EF4-FFF2-40B4-BE49-F238E27FC236}">
+                <a16:creationId xmlns:a16="http://schemas.microsoft.com/office/drawing/2014/main" id="{584FE88A-ED19-CC4B-B7F6-C38946F84ED5}"/>
+              </a:ext>
+            </a:extLst>
+          </p:cNvPr>
+          <p:cNvSpPr>
+            <a:spLocks noGrp="1"/>
+          </p:cNvSpPr>
+          <p:nvPr>
+            <p:ph type="dt" sz="half" idx="2"/>
+          </p:nvPr>
+        </p:nvSpPr>
+        <p:spPr/>
+        <p:txBody>
+          <a:bodyPr/>
+          <a:lstStyle/>
+          <a:p>
+            <a:r>
+              <a:rPr lang="en-US"/>
+              <a:t>Luca Brodo - HSHL</a:t>
+            </a:r>
+            <a:endParaRPr lang="en-US" dirty="0"/>
+          </a:p>
+        </p:txBody>
+      </p:sp>
+    </p:spTree>
+    <p:extLst>
+      <p:ext uri="{BB962C8B-B14F-4D97-AF65-F5344CB8AC3E}">
+        <p14:creationId xmlns:p14="http://schemas.microsoft.com/office/powerpoint/2010/main" val="382831783"/>
+      </p:ext>
+    </p:extLst>
+  </p:cSld>
+  <p:clrMapOvr>
+    <a:masterClrMapping/>
+  </p:clrMapOvr>
+</p:sld>
+</file>
+
+<file path=ppt/slides/slide11.xml><?xml version="1.0" encoding="utf-8"?>
+<p:sld xmlns:a="http://schemas.openxmlformats.org/drawingml/2006/main" xmlns:r="http://schemas.openxmlformats.org/officeDocument/2006/relationships" xmlns:p="http://schemas.openxmlformats.org/presentationml/2006/main">
+  <p:cSld>
+    <p:spTree>
+      <p:nvGrpSpPr>
+        <p:cNvPr id="1" name=""/>
+        <p:cNvGrpSpPr/>
+        <p:nvPr/>
+      </p:nvGrpSpPr>
+      <p:grpSpPr>
+        <a:xfrm>
+          <a:off x="0" y="0"/>
+          <a:ext cx="0" cy="0"/>
+          <a:chOff x="0" y="0"/>
+          <a:chExt cx="0" cy="0"/>
+        </a:xfrm>
+      </p:grpSpPr>
+      <p:sp>
+        <p:nvSpPr>
+          <p:cNvPr id="2" name="Titolo 1">
+            <a:extLst>
+              <a:ext uri="{FF2B5EF4-FFF2-40B4-BE49-F238E27FC236}">
+                <a16:creationId xmlns:a16="http://schemas.microsoft.com/office/drawing/2014/main" id="{33F75CFA-0978-2C49-B129-0D64A7E11944}"/>
+              </a:ext>
+            </a:extLst>
+          </p:cNvPr>
+          <p:cNvSpPr>
+            <a:spLocks noGrp="1"/>
+          </p:cNvSpPr>
+          <p:nvPr>
+            <p:ph type="title"/>
+          </p:nvPr>
+        </p:nvSpPr>
+        <p:spPr/>
+        <p:txBody>
+          <a:bodyPr/>
+          <a:lstStyle/>
+          <a:p>
+            <a:r>
+              <a:rPr lang="en-GB" dirty="0"/>
+              <a:t>How do we analyse the models? </a:t>
+            </a:r>
+          </a:p>
+        </p:txBody>
+      </p:sp>
+      <p:sp>
+        <p:nvSpPr>
+          <p:cNvPr id="4" name="Segnaposto numero diapositiva 3">
+            <a:extLst>
+              <a:ext uri="{FF2B5EF4-FFF2-40B4-BE49-F238E27FC236}">
+                <a16:creationId xmlns:a16="http://schemas.microsoft.com/office/drawing/2014/main" id="{8BC27D13-0283-4742-A930-8CA100DD9A15}"/>
+              </a:ext>
+            </a:extLst>
+          </p:cNvPr>
+          <p:cNvSpPr>
+            <a:spLocks noGrp="1"/>
+          </p:cNvSpPr>
+          <p:nvPr>
+            <p:ph type="sldNum" sz="quarter" idx="4"/>
+          </p:nvPr>
+        </p:nvSpPr>
+        <p:spPr/>
+        <p:txBody>
+          <a:bodyPr/>
+          <a:lstStyle/>
+          <a:p>
+            <a:fld id="{3CA77444-643D-DC4A-BC90-63FB0CFBEC9C}" type="slidenum">
+              <a:rPr lang="en-US" smtClean="0"/>
+              <a:pPr/>
+              <a:t>11</a:t>
+            </a:fld>
+            <a:endParaRPr lang="en-US" dirty="0"/>
+          </a:p>
+        </p:txBody>
+      </p:sp>
+      <p:sp>
+        <p:nvSpPr>
+          <p:cNvPr id="5" name="Segnaposto data 4">
+            <a:extLst>
+              <a:ext uri="{FF2B5EF4-FFF2-40B4-BE49-F238E27FC236}">
+                <a16:creationId xmlns:a16="http://schemas.microsoft.com/office/drawing/2014/main" id="{1C04ACD9-E715-0240-9450-6979FD65D55B}"/>
+              </a:ext>
+            </a:extLst>
+          </p:cNvPr>
+          <p:cNvSpPr>
+            <a:spLocks noGrp="1"/>
+          </p:cNvSpPr>
+          <p:nvPr>
+            <p:ph type="dt" sz="half" idx="2"/>
+          </p:nvPr>
+        </p:nvSpPr>
+        <p:spPr/>
+        <p:txBody>
+          <a:bodyPr/>
+          <a:lstStyle/>
+          <a:p>
+            <a:r>
+              <a:rPr lang="en-US"/>
+              <a:t>Luca Brodo - HSHL</a:t>
+            </a:r>
+            <a:endParaRPr lang="en-US" dirty="0"/>
+          </a:p>
+        </p:txBody>
+      </p:sp>
+      <p:pic>
+        <p:nvPicPr>
+          <p:cNvPr id="9" name="Segnaposto contenuto 8">
+            <a:extLst>
+              <a:ext uri="{FF2B5EF4-FFF2-40B4-BE49-F238E27FC236}">
+                <a16:creationId xmlns:a16="http://schemas.microsoft.com/office/drawing/2014/main" id="{42B20E36-1345-4546-8BFB-31BE8A92B971}"/>
+              </a:ext>
+            </a:extLst>
+          </p:cNvPr>
+          <p:cNvPicPr>
+            <a:picLocks noGrp="1" noChangeAspect="1"/>
+          </p:cNvPicPr>
+          <p:nvPr>
+            <p:ph idx="1"/>
+          </p:nvPr>
+        </p:nvPicPr>
+        <p:blipFill>
+          <a:blip r:embed="rId2"/>
+          <a:stretch>
+            <a:fillRect/>
+          </a:stretch>
+        </p:blipFill>
+        <p:spPr>
+          <a:xfrm>
+            <a:off x="2115444" y="1564689"/>
+            <a:ext cx="7961111" cy="3728621"/>
+          </a:xfrm>
+        </p:spPr>
+      </p:pic>
+    </p:spTree>
+    <p:extLst>
+      <p:ext uri="{BB962C8B-B14F-4D97-AF65-F5344CB8AC3E}">
+        <p14:creationId xmlns:p14="http://schemas.microsoft.com/office/powerpoint/2010/main" val="2444328643"/>
+      </p:ext>
+    </p:extLst>
+  </p:cSld>
+  <p:clrMapOvr>
+    <a:masterClrMapping/>
+  </p:clrMapOvr>
+</p:sld>
+</file>
+
+<file path=ppt/slides/slide12.xml><?xml version="1.0" encoding="utf-8"?>
+<p:sld xmlns:a="http://schemas.openxmlformats.org/drawingml/2006/main" xmlns:r="http://schemas.openxmlformats.org/officeDocument/2006/relationships" xmlns:p="http://schemas.openxmlformats.org/presentationml/2006/main">
+  <p:cSld>
+    <p:spTree>
+      <p:nvGrpSpPr>
+        <p:cNvPr id="1" name=""/>
+        <p:cNvGrpSpPr/>
+        <p:nvPr/>
+      </p:nvGrpSpPr>
+      <p:grpSpPr>
+        <a:xfrm>
+          <a:off x="0" y="0"/>
+          <a:ext cx="0" cy="0"/>
+          <a:chOff x="0" y="0"/>
+          <a:chExt cx="0" cy="0"/>
+        </a:xfrm>
+      </p:grpSpPr>
+      <p:sp>
+        <p:nvSpPr>
+          <p:cNvPr id="2" name="Titolo 1">
+            <a:extLst>
+              <a:ext uri="{FF2B5EF4-FFF2-40B4-BE49-F238E27FC236}">
+                <a16:creationId xmlns:a16="http://schemas.microsoft.com/office/drawing/2014/main" id="{6BCA9ABE-99EE-7D40-97B3-6E2A73D1ADAA}"/>
+              </a:ext>
+            </a:extLst>
+          </p:cNvPr>
+          <p:cNvSpPr>
+            <a:spLocks noGrp="1"/>
+          </p:cNvSpPr>
+          <p:nvPr>
+            <p:ph type="title"/>
+          </p:nvPr>
+        </p:nvSpPr>
+        <p:spPr/>
+        <p:txBody>
+          <a:bodyPr/>
+          <a:lstStyle/>
+          <a:p>
+            <a:r>
+              <a:rPr lang="en-GB" dirty="0"/>
+              <a:t>Use case</a:t>
+            </a:r>
+          </a:p>
+        </p:txBody>
+      </p:sp>
+      <p:sp>
+        <p:nvSpPr>
+          <p:cNvPr id="3" name="Segnaposto contenuto 2">
+            <a:extLst>
+              <a:ext uri="{FF2B5EF4-FFF2-40B4-BE49-F238E27FC236}">
+                <a16:creationId xmlns:a16="http://schemas.microsoft.com/office/drawing/2014/main" id="{40129135-5223-1F49-9548-D48EBCFC00D6}"/>
+              </a:ext>
+            </a:extLst>
+          </p:cNvPr>
+          <p:cNvSpPr>
+            <a:spLocks noGrp="1"/>
+          </p:cNvSpPr>
+          <p:nvPr>
+            <p:ph idx="1"/>
+          </p:nvPr>
+        </p:nvSpPr>
+        <p:spPr/>
+        <p:txBody>
+          <a:bodyPr/>
+          <a:lstStyle/>
+          <a:p>
+            <a:pPr>
+              <a:lnSpc>
+                <a:spcPct val="200000"/>
+              </a:lnSpc>
+            </a:pPr>
+            <a:r>
+              <a:rPr lang="en-GB" dirty="0"/>
+              <a:t>“Plants_seedlings_v2” dataset</a:t>
+            </a:r>
+          </a:p>
+          <a:p>
+            <a:pPr>
+              <a:lnSpc>
+                <a:spcPct val="200000"/>
+              </a:lnSpc>
+            </a:pPr>
+            <a:r>
+              <a:rPr lang="en-GB" dirty="0"/>
+              <a:t>~1000 images of seedlings of 12 species</a:t>
+            </a:r>
+          </a:p>
+          <a:p>
+            <a:pPr>
+              <a:lnSpc>
+                <a:spcPct val="200000"/>
+              </a:lnSpc>
+            </a:pPr>
+            <a:r>
+              <a:rPr lang="en-GB" dirty="0"/>
+              <a:t>10 pixels per mm</a:t>
+            </a:r>
+          </a:p>
+        </p:txBody>
+      </p:sp>
+      <p:sp>
+        <p:nvSpPr>
+          <p:cNvPr id="4" name="Segnaposto numero diapositiva 3">
+            <a:extLst>
+              <a:ext uri="{FF2B5EF4-FFF2-40B4-BE49-F238E27FC236}">
+                <a16:creationId xmlns:a16="http://schemas.microsoft.com/office/drawing/2014/main" id="{033EAE32-90A4-C841-BF6E-A3B229E51295}"/>
+              </a:ext>
+            </a:extLst>
+          </p:cNvPr>
+          <p:cNvSpPr>
+            <a:spLocks noGrp="1"/>
+          </p:cNvSpPr>
+          <p:nvPr>
+            <p:ph type="sldNum" sz="quarter" idx="4"/>
+          </p:nvPr>
+        </p:nvSpPr>
+        <p:spPr/>
+        <p:txBody>
+          <a:bodyPr/>
+          <a:lstStyle/>
+          <a:p>
+            <a:fld id="{3CA77444-643D-DC4A-BC90-63FB0CFBEC9C}" type="slidenum">
+              <a:rPr lang="en-US" smtClean="0"/>
+              <a:pPr/>
+              <a:t>12</a:t>
+            </a:fld>
+            <a:endParaRPr lang="en-US" dirty="0"/>
+          </a:p>
+        </p:txBody>
+      </p:sp>
+      <p:sp>
+        <p:nvSpPr>
+          <p:cNvPr id="5" name="Segnaposto data 4">
+            <a:extLst>
+              <a:ext uri="{FF2B5EF4-FFF2-40B4-BE49-F238E27FC236}">
+                <a16:creationId xmlns:a16="http://schemas.microsoft.com/office/drawing/2014/main" id="{356BE2CA-C63A-C048-A841-DD176940BA43}"/>
+              </a:ext>
+            </a:extLst>
+          </p:cNvPr>
+          <p:cNvSpPr>
+            <a:spLocks noGrp="1"/>
+          </p:cNvSpPr>
+          <p:nvPr>
+            <p:ph type="dt" sz="half" idx="2"/>
+          </p:nvPr>
+        </p:nvSpPr>
+        <p:spPr/>
+        <p:txBody>
+          <a:bodyPr/>
+          <a:lstStyle/>
+          <a:p>
+            <a:r>
+              <a:rPr lang="en-US"/>
+              <a:t>Luca Brodo - HSHL</a:t>
+            </a:r>
+            <a:endParaRPr lang="en-US" dirty="0"/>
+          </a:p>
+        </p:txBody>
+      </p:sp>
+      <p:pic>
+        <p:nvPicPr>
+          <p:cNvPr id="7" name="Immagine 6">
+            <a:extLst>
+              <a:ext uri="{FF2B5EF4-FFF2-40B4-BE49-F238E27FC236}">
+                <a16:creationId xmlns:a16="http://schemas.microsoft.com/office/drawing/2014/main" id="{F9B47BEC-20AC-834D-A831-9F89CFCEBB9B}"/>
+              </a:ext>
+            </a:extLst>
+          </p:cNvPr>
+          <p:cNvPicPr>
+            <a:picLocks noChangeAspect="1"/>
+          </p:cNvPicPr>
+          <p:nvPr/>
+        </p:nvPicPr>
+        <p:blipFill>
+          <a:blip r:embed="rId2"/>
+          <a:stretch>
+            <a:fillRect/>
+          </a:stretch>
+        </p:blipFill>
+        <p:spPr>
+          <a:xfrm>
+            <a:off x="8112667" y="1035050"/>
+            <a:ext cx="2679700" cy="4787900"/>
+          </a:xfrm>
+          <a:prstGeom prst="rect">
+            <a:avLst/>
+          </a:prstGeom>
+        </p:spPr>
+      </p:pic>
+    </p:spTree>
+    <p:extLst>
+      <p:ext uri="{BB962C8B-B14F-4D97-AF65-F5344CB8AC3E}">
+        <p14:creationId xmlns:p14="http://schemas.microsoft.com/office/powerpoint/2010/main" val="1963818321"/>
+      </p:ext>
+    </p:extLst>
+  </p:cSld>
+  <p:clrMapOvr>
+    <a:masterClrMapping/>
+  </p:clrMapOvr>
+</p:sld>
+</file>
+
+<file path=ppt/slides/slide13.xml><?xml version="1.0" encoding="utf-8"?>
+<p:sld xmlns:a="http://schemas.openxmlformats.org/drawingml/2006/main" xmlns:r="http://schemas.openxmlformats.org/officeDocument/2006/relationships" xmlns:p="http://schemas.openxmlformats.org/presentationml/2006/main">
+  <p:cSld>
+    <p:spTree>
+      <p:nvGrpSpPr>
+        <p:cNvPr id="1" name=""/>
+        <p:cNvGrpSpPr/>
+        <p:nvPr/>
+      </p:nvGrpSpPr>
+      <p:grpSpPr>
+        <a:xfrm>
+          <a:off x="0" y="0"/>
+          <a:ext cx="0" cy="0"/>
+          <a:chOff x="0" y="0"/>
+          <a:chExt cx="0" cy="0"/>
+        </a:xfrm>
+      </p:grpSpPr>
+      <p:sp>
+        <p:nvSpPr>
+          <p:cNvPr id="4" name="Segnaposto numero diapositiva 3">
+            <a:extLst>
+              <a:ext uri="{FF2B5EF4-FFF2-40B4-BE49-F238E27FC236}">
+                <a16:creationId xmlns:a16="http://schemas.microsoft.com/office/drawing/2014/main" id="{9BE5D24F-6D41-A040-8563-C9375B8CC2A7}"/>
+              </a:ext>
+            </a:extLst>
+          </p:cNvPr>
+          <p:cNvSpPr>
+            <a:spLocks noGrp="1"/>
+          </p:cNvSpPr>
+          <p:nvPr>
+            <p:ph type="sldNum" sz="quarter" idx="4"/>
+          </p:nvPr>
+        </p:nvSpPr>
+        <p:spPr/>
+        <p:txBody>
+          <a:bodyPr/>
+          <a:lstStyle/>
+          <a:p>
+            <a:fld id="{3CA77444-643D-DC4A-BC90-63FB0CFBEC9C}" type="slidenum">
+              <a:rPr lang="en-US" smtClean="0"/>
+              <a:pPr/>
+              <a:t>13</a:t>
+            </a:fld>
+            <a:endParaRPr lang="en-US" dirty="0"/>
+          </a:p>
+        </p:txBody>
+      </p:sp>
+      <p:sp>
+        <p:nvSpPr>
+          <p:cNvPr id="5" name="Segnaposto data 4">
+            <a:extLst>
+              <a:ext uri="{FF2B5EF4-FFF2-40B4-BE49-F238E27FC236}">
+                <a16:creationId xmlns:a16="http://schemas.microsoft.com/office/drawing/2014/main" id="{DC3B4ED9-3A7A-1E48-B3B0-CB8821AC6B47}"/>
+              </a:ext>
+            </a:extLst>
+          </p:cNvPr>
+          <p:cNvSpPr>
+            <a:spLocks noGrp="1"/>
+          </p:cNvSpPr>
+          <p:nvPr>
+            <p:ph type="dt" sz="half" idx="2"/>
+          </p:nvPr>
+        </p:nvSpPr>
+        <p:spPr/>
+        <p:txBody>
+          <a:bodyPr/>
+          <a:lstStyle/>
+          <a:p>
+            <a:r>
+              <a:rPr lang="en-US"/>
+              <a:t>Luca Brodo - HSHL</a:t>
+            </a:r>
+            <a:endParaRPr lang="en-US" dirty="0"/>
+          </a:p>
+        </p:txBody>
+      </p:sp>
+      <p:pic>
+        <p:nvPicPr>
+          <p:cNvPr id="7" name="Immagine 6">
+            <a:extLst>
+              <a:ext uri="{FF2B5EF4-FFF2-40B4-BE49-F238E27FC236}">
+                <a16:creationId xmlns:a16="http://schemas.microsoft.com/office/drawing/2014/main" id="{D8CC8427-9C89-2D49-9C14-E01C181C4731}"/>
+              </a:ext>
+            </a:extLst>
+          </p:cNvPr>
+          <p:cNvPicPr>
+            <a:picLocks noChangeAspect="1"/>
+          </p:cNvPicPr>
+          <p:nvPr/>
+        </p:nvPicPr>
+        <p:blipFill>
+          <a:blip r:embed="rId2"/>
+          <a:stretch>
+            <a:fillRect/>
+          </a:stretch>
+        </p:blipFill>
+        <p:spPr>
+          <a:xfrm>
+            <a:off x="1510030" y="945633"/>
+            <a:ext cx="9171940" cy="5283342"/>
+          </a:xfrm>
+          <a:prstGeom prst="rect">
+            <a:avLst/>
+          </a:prstGeom>
+        </p:spPr>
+      </p:pic>
+      <p:pic>
+        <p:nvPicPr>
+          <p:cNvPr id="9" name="Immagine 8">
+            <a:extLst>
+              <a:ext uri="{FF2B5EF4-FFF2-40B4-BE49-F238E27FC236}">
+                <a16:creationId xmlns:a16="http://schemas.microsoft.com/office/drawing/2014/main" id="{C6ADA199-E6D2-574A-AFB9-A36145FCB1A6}"/>
+              </a:ext>
+            </a:extLst>
+          </p:cNvPr>
+          <p:cNvPicPr>
+            <a:picLocks noChangeAspect="1"/>
+          </p:cNvPicPr>
+          <p:nvPr/>
+        </p:nvPicPr>
+        <p:blipFill rotWithShape="1">
+          <a:blip r:embed="rId3"/>
+          <a:srcRect b="3629"/>
+          <a:stretch/>
+        </p:blipFill>
+        <p:spPr>
+          <a:xfrm>
+            <a:off x="2849908" y="3195320"/>
+            <a:ext cx="6212509" cy="2352039"/>
+          </a:xfrm>
+          <a:prstGeom prst="rect">
+            <a:avLst/>
+          </a:prstGeom>
+          <a:solidFill>
+            <a:srgbClr val="FFFFFF">
+              <a:shade val="85000"/>
+            </a:srgbClr>
+          </a:solidFill>
+          <a:ln w="88900" cap="sq">
+            <a:solidFill>
+              <a:srgbClr val="FFFFFF"/>
+            </a:solidFill>
+            <a:miter lim="800000"/>
+          </a:ln>
+          <a:effectLst>
+            <a:outerShdw blurRad="55000" dist="18000" dir="5400000" algn="tl" rotWithShape="0">
+              <a:srgbClr val="000000">
+                <a:alpha val="40000"/>
+              </a:srgbClr>
+            </a:outerShdw>
+          </a:effectLst>
+          <a:scene3d>
+            <a:camera prst="orthographicFront"/>
+            <a:lightRig rig="twoPt" dir="t">
+              <a:rot lat="0" lon="0" rev="7200000"/>
+            </a:lightRig>
+          </a:scene3d>
+          <a:sp3d>
+            <a:bevelT w="25400" h="19050"/>
+            <a:contourClr>
+              <a:srgbClr val="FFFFFF"/>
+            </a:contourClr>
+          </a:sp3d>
+        </p:spPr>
+      </p:pic>
+      <p:sp>
+        <p:nvSpPr>
+          <p:cNvPr id="10" name="Titolo 1">
+            <a:extLst>
+              <a:ext uri="{FF2B5EF4-FFF2-40B4-BE49-F238E27FC236}">
+                <a16:creationId xmlns:a16="http://schemas.microsoft.com/office/drawing/2014/main" id="{4EA3A3AF-8892-1E4C-944E-F6FB8309E8A7}"/>
+              </a:ext>
+            </a:extLst>
+          </p:cNvPr>
+          <p:cNvSpPr>
+            <a:spLocks noGrp="1"/>
+          </p:cNvSpPr>
+          <p:nvPr>
+            <p:ph type="title"/>
+          </p:nvPr>
+        </p:nvSpPr>
+        <p:spPr>
+          <a:xfrm>
+            <a:off x="476451" y="0"/>
+            <a:ext cx="10515600" cy="1325563"/>
+          </a:xfrm>
+        </p:spPr>
+        <p:txBody>
+          <a:bodyPr/>
+          <a:lstStyle/>
+          <a:p>
+            <a:r>
+              <a:rPr lang="en-GB" dirty="0"/>
+              <a:t>Training time</a:t>
+            </a:r>
+          </a:p>
+        </p:txBody>
+      </p:sp>
+    </p:spTree>
+    <p:extLst>
+      <p:ext uri="{BB962C8B-B14F-4D97-AF65-F5344CB8AC3E}">
+        <p14:creationId xmlns:p14="http://schemas.microsoft.com/office/powerpoint/2010/main" val="3416853282"/>
+      </p:ext>
+    </p:extLst>
+  </p:cSld>
+  <p:clrMapOvr>
+    <a:masterClrMapping/>
+  </p:clrMapOvr>
+</p:sld>
+</file>
+
+<file path=ppt/slides/slide14.xml><?xml version="1.0" encoding="utf-8"?>
+<p:sld xmlns:a="http://schemas.openxmlformats.org/drawingml/2006/main" xmlns:r="http://schemas.openxmlformats.org/officeDocument/2006/relationships" xmlns:p="http://schemas.openxmlformats.org/presentationml/2006/main">
+  <p:cSld>
+    <p:spTree>
+      <p:nvGrpSpPr>
+        <p:cNvPr id="1" name=""/>
+        <p:cNvGrpSpPr/>
+        <p:nvPr/>
+      </p:nvGrpSpPr>
+      <p:grpSpPr>
+        <a:xfrm>
+          <a:off x="0" y="0"/>
+          <a:ext cx="0" cy="0"/>
+          <a:chOff x="0" y="0"/>
+          <a:chExt cx="0" cy="0"/>
+        </a:xfrm>
+      </p:grpSpPr>
+      <p:sp>
+        <p:nvSpPr>
+          <p:cNvPr id="4" name="Segnaposto numero diapositiva 3">
+            <a:extLst>
+              <a:ext uri="{FF2B5EF4-FFF2-40B4-BE49-F238E27FC236}">
+                <a16:creationId xmlns:a16="http://schemas.microsoft.com/office/drawing/2014/main" id="{9BE5D24F-6D41-A040-8563-C9375B8CC2A7}"/>
+              </a:ext>
+            </a:extLst>
+          </p:cNvPr>
+          <p:cNvSpPr>
+            <a:spLocks noGrp="1"/>
+          </p:cNvSpPr>
+          <p:nvPr>
+            <p:ph type="sldNum" sz="quarter" idx="4"/>
+          </p:nvPr>
+        </p:nvSpPr>
+        <p:spPr/>
+        <p:txBody>
+          <a:bodyPr/>
+          <a:lstStyle/>
+          <a:p>
+            <a:fld id="{3CA77444-643D-DC4A-BC90-63FB0CFBEC9C}" type="slidenum">
+              <a:rPr lang="en-US" smtClean="0"/>
+              <a:pPr/>
+              <a:t>14</a:t>
             </a:fld>
             <a:endParaRPr lang="en-US" dirty="0"/>
           </a:p>
@@ -2377,806 +3658,6 @@
 </p:sld>
 </file>
 
-<file path=ppt/slides/slide11.xml><?xml version="1.0" encoding="utf-8"?>
-<p:sld xmlns:a="http://schemas.openxmlformats.org/drawingml/2006/main" xmlns:r="http://schemas.openxmlformats.org/officeDocument/2006/relationships" xmlns:p="http://schemas.openxmlformats.org/presentationml/2006/main">
-  <p:cSld>
-    <p:spTree>
-      <p:nvGrpSpPr>
-        <p:cNvPr id="1" name=""/>
-        <p:cNvGrpSpPr/>
-        <p:nvPr/>
-      </p:nvGrpSpPr>
-      <p:grpSpPr>
-        <a:xfrm>
-          <a:off x="0" y="0"/>
-          <a:ext cx="0" cy="0"/>
-          <a:chOff x="0" y="0"/>
-          <a:chExt cx="0" cy="0"/>
-        </a:xfrm>
-      </p:grpSpPr>
-      <p:sp>
-        <p:nvSpPr>
-          <p:cNvPr id="2" name="Titolo 1">
-            <a:extLst>
-              <a:ext uri="{FF2B5EF4-FFF2-40B4-BE49-F238E27FC236}">
-                <a16:creationId xmlns:a16="http://schemas.microsoft.com/office/drawing/2014/main" id="{F1E6ECD5-EA9A-094D-BEF4-2616095B02D7}"/>
-              </a:ext>
-            </a:extLst>
-          </p:cNvPr>
-          <p:cNvSpPr>
-            <a:spLocks noGrp="1"/>
-          </p:cNvSpPr>
-          <p:nvPr>
-            <p:ph type="title"/>
-          </p:nvPr>
-        </p:nvSpPr>
-        <p:spPr/>
-        <p:txBody>
-          <a:bodyPr/>
-          <a:lstStyle/>
-          <a:p>
-            <a:endParaRPr lang="en-GB"/>
-          </a:p>
-        </p:txBody>
-      </p:sp>
-      <p:sp>
-        <p:nvSpPr>
-          <p:cNvPr id="3" name="Segnaposto contenuto 2">
-            <a:extLst>
-              <a:ext uri="{FF2B5EF4-FFF2-40B4-BE49-F238E27FC236}">
-                <a16:creationId xmlns:a16="http://schemas.microsoft.com/office/drawing/2014/main" id="{056F26CA-B752-0B45-8476-A8E2EA946D64}"/>
-              </a:ext>
-            </a:extLst>
-          </p:cNvPr>
-          <p:cNvSpPr>
-            <a:spLocks noGrp="1"/>
-          </p:cNvSpPr>
-          <p:nvPr>
-            <p:ph idx="1"/>
-          </p:nvPr>
-        </p:nvSpPr>
-        <p:spPr/>
-        <p:txBody>
-          <a:bodyPr/>
-          <a:lstStyle/>
-          <a:p>
-            <a:pPr>
-              <a:lnSpc>
-                <a:spcPct val="200000"/>
-              </a:lnSpc>
-            </a:pPr>
-            <a:r>
-              <a:rPr lang="en-GB" dirty="0"/>
-              <a:t>The inference time is related to the amount of the NN layers</a:t>
-            </a:r>
-          </a:p>
-          <a:p>
-            <a:pPr>
-              <a:lnSpc>
-                <a:spcPct val="200000"/>
-              </a:lnSpc>
-            </a:pPr>
-            <a:r>
-              <a:rPr lang="en-GB" dirty="0"/>
-              <a:t>Inference time is related to training time</a:t>
-            </a:r>
-          </a:p>
-          <a:p>
-            <a:pPr>
-              <a:lnSpc>
-                <a:spcPct val="200000"/>
-              </a:lnSpc>
-            </a:pPr>
-            <a:r>
-              <a:rPr lang="en-GB" dirty="0"/>
-              <a:t>We can relate accuracy to inference time</a:t>
-            </a:r>
-          </a:p>
-          <a:p>
-            <a:endParaRPr lang="en-GB" dirty="0"/>
-          </a:p>
-        </p:txBody>
-      </p:sp>
-      <p:sp>
-        <p:nvSpPr>
-          <p:cNvPr id="4" name="Segnaposto numero diapositiva 3">
-            <a:extLst>
-              <a:ext uri="{FF2B5EF4-FFF2-40B4-BE49-F238E27FC236}">
-                <a16:creationId xmlns:a16="http://schemas.microsoft.com/office/drawing/2014/main" id="{55EFB383-C2EC-3F41-9DF1-09CE7AEF27E9}"/>
-              </a:ext>
-            </a:extLst>
-          </p:cNvPr>
-          <p:cNvSpPr>
-            <a:spLocks noGrp="1"/>
-          </p:cNvSpPr>
-          <p:nvPr>
-            <p:ph type="sldNum" sz="quarter" idx="4"/>
-          </p:nvPr>
-        </p:nvSpPr>
-        <p:spPr/>
-        <p:txBody>
-          <a:bodyPr/>
-          <a:lstStyle/>
-          <a:p>
-            <a:fld id="{3CA77444-643D-DC4A-BC90-63FB0CFBEC9C}" type="slidenum">
-              <a:rPr lang="en-US" smtClean="0"/>
-              <a:pPr/>
-              <a:t>11</a:t>
-            </a:fld>
-            <a:endParaRPr lang="en-US" dirty="0"/>
-          </a:p>
-        </p:txBody>
-      </p:sp>
-      <p:sp>
-        <p:nvSpPr>
-          <p:cNvPr id="5" name="Segnaposto data 4">
-            <a:extLst>
-              <a:ext uri="{FF2B5EF4-FFF2-40B4-BE49-F238E27FC236}">
-                <a16:creationId xmlns:a16="http://schemas.microsoft.com/office/drawing/2014/main" id="{584FE88A-ED19-CC4B-B7F6-C38946F84ED5}"/>
-              </a:ext>
-            </a:extLst>
-          </p:cNvPr>
-          <p:cNvSpPr>
-            <a:spLocks noGrp="1"/>
-          </p:cNvSpPr>
-          <p:nvPr>
-            <p:ph type="dt" sz="half" idx="2"/>
-          </p:nvPr>
-        </p:nvSpPr>
-        <p:spPr/>
-        <p:txBody>
-          <a:bodyPr/>
-          <a:lstStyle/>
-          <a:p>
-            <a:r>
-              <a:rPr lang="en-US"/>
-              <a:t>Luca Brodo - HSHL</a:t>
-            </a:r>
-            <a:endParaRPr lang="en-US" dirty="0"/>
-          </a:p>
-        </p:txBody>
-      </p:sp>
-    </p:spTree>
-    <p:extLst>
-      <p:ext uri="{BB962C8B-B14F-4D97-AF65-F5344CB8AC3E}">
-        <p14:creationId xmlns:p14="http://schemas.microsoft.com/office/powerpoint/2010/main" val="382831783"/>
-      </p:ext>
-    </p:extLst>
-  </p:cSld>
-  <p:clrMapOvr>
-    <a:masterClrMapping/>
-  </p:clrMapOvr>
-</p:sld>
-</file>
-
-<file path=ppt/slides/slide12.xml><?xml version="1.0" encoding="utf-8"?>
-<p:sld xmlns:a="http://schemas.openxmlformats.org/drawingml/2006/main" xmlns:r="http://schemas.openxmlformats.org/officeDocument/2006/relationships" xmlns:p="http://schemas.openxmlformats.org/presentationml/2006/main">
-  <p:cSld>
-    <p:spTree>
-      <p:nvGrpSpPr>
-        <p:cNvPr id="1" name=""/>
-        <p:cNvGrpSpPr/>
-        <p:nvPr/>
-      </p:nvGrpSpPr>
-      <p:grpSpPr>
-        <a:xfrm>
-          <a:off x="0" y="0"/>
-          <a:ext cx="0" cy="0"/>
-          <a:chOff x="0" y="0"/>
-          <a:chExt cx="0" cy="0"/>
-        </a:xfrm>
-      </p:grpSpPr>
-      <p:sp>
-        <p:nvSpPr>
-          <p:cNvPr id="2" name="Titolo 1">
-            <a:extLst>
-              <a:ext uri="{FF2B5EF4-FFF2-40B4-BE49-F238E27FC236}">
-                <a16:creationId xmlns:a16="http://schemas.microsoft.com/office/drawing/2014/main" id="{6F99199E-F7CD-9642-B1D9-7E4B365AADD8}"/>
-              </a:ext>
-            </a:extLst>
-          </p:cNvPr>
-          <p:cNvSpPr>
-            <a:spLocks noGrp="1"/>
-          </p:cNvSpPr>
-          <p:nvPr>
-            <p:ph type="title"/>
-          </p:nvPr>
-        </p:nvSpPr>
-        <p:spPr/>
-        <p:txBody>
-          <a:bodyPr/>
-          <a:lstStyle/>
-          <a:p>
-            <a:endParaRPr lang="en-GB" dirty="0"/>
-          </a:p>
-        </p:txBody>
-      </p:sp>
-      <p:pic>
-        <p:nvPicPr>
-          <p:cNvPr id="7" name="Segnaposto contenuto 6">
-            <a:extLst>
-              <a:ext uri="{FF2B5EF4-FFF2-40B4-BE49-F238E27FC236}">
-                <a16:creationId xmlns:a16="http://schemas.microsoft.com/office/drawing/2014/main" id="{87D3EF76-524C-B54F-A574-8E778793D4E5}"/>
-              </a:ext>
-            </a:extLst>
-          </p:cNvPr>
-          <p:cNvPicPr>
-            <a:picLocks noGrp="1" noChangeAspect="1"/>
-          </p:cNvPicPr>
-          <p:nvPr>
-            <p:ph idx="1"/>
-          </p:nvPr>
-        </p:nvPicPr>
-        <p:blipFill>
-          <a:blip r:embed="rId2"/>
-          <a:stretch>
-            <a:fillRect/>
-          </a:stretch>
-        </p:blipFill>
-        <p:spPr>
-          <a:xfrm>
-            <a:off x="2284686" y="1690688"/>
-            <a:ext cx="7695180" cy="4351338"/>
-          </a:xfrm>
-        </p:spPr>
-      </p:pic>
-      <p:sp>
-        <p:nvSpPr>
-          <p:cNvPr id="4" name="Segnaposto numero diapositiva 3">
-            <a:extLst>
-              <a:ext uri="{FF2B5EF4-FFF2-40B4-BE49-F238E27FC236}">
-                <a16:creationId xmlns:a16="http://schemas.microsoft.com/office/drawing/2014/main" id="{E8E68C83-5B95-EC4C-8792-A579A80C8FC0}"/>
-              </a:ext>
-            </a:extLst>
-          </p:cNvPr>
-          <p:cNvSpPr>
-            <a:spLocks noGrp="1"/>
-          </p:cNvSpPr>
-          <p:nvPr>
-            <p:ph type="sldNum" sz="quarter" idx="4"/>
-          </p:nvPr>
-        </p:nvSpPr>
-        <p:spPr/>
-        <p:txBody>
-          <a:bodyPr/>
-          <a:lstStyle/>
-          <a:p>
-            <a:fld id="{3CA77444-643D-DC4A-BC90-63FB0CFBEC9C}" type="slidenum">
-              <a:rPr lang="en-US" smtClean="0"/>
-              <a:pPr/>
-              <a:t>12</a:t>
-            </a:fld>
-            <a:endParaRPr lang="en-US" dirty="0"/>
-          </a:p>
-        </p:txBody>
-      </p:sp>
-      <p:sp>
-        <p:nvSpPr>
-          <p:cNvPr id="5" name="Segnaposto data 4">
-            <a:extLst>
-              <a:ext uri="{FF2B5EF4-FFF2-40B4-BE49-F238E27FC236}">
-                <a16:creationId xmlns:a16="http://schemas.microsoft.com/office/drawing/2014/main" id="{50A70004-4C21-064F-A267-4F571D65970F}"/>
-              </a:ext>
-            </a:extLst>
-          </p:cNvPr>
-          <p:cNvSpPr>
-            <a:spLocks noGrp="1"/>
-          </p:cNvSpPr>
-          <p:nvPr>
-            <p:ph type="dt" sz="half" idx="2"/>
-          </p:nvPr>
-        </p:nvSpPr>
-        <p:spPr/>
-        <p:txBody>
-          <a:bodyPr/>
-          <a:lstStyle/>
-          <a:p>
-            <a:r>
-              <a:rPr lang="en-US"/>
-              <a:t>Luca Brodo - HSHL</a:t>
-            </a:r>
-            <a:endParaRPr lang="en-US" dirty="0"/>
-          </a:p>
-        </p:txBody>
-      </p:sp>
-      <p:sp>
-        <p:nvSpPr>
-          <p:cNvPr id="8" name="CasellaDiTesto 7">
-            <a:extLst>
-              <a:ext uri="{FF2B5EF4-FFF2-40B4-BE49-F238E27FC236}">
-                <a16:creationId xmlns:a16="http://schemas.microsoft.com/office/drawing/2014/main" id="{B11109DD-4E13-004A-AD46-BD7214094904}"/>
-              </a:ext>
-            </a:extLst>
-          </p:cNvPr>
-          <p:cNvSpPr txBox="1"/>
-          <p:nvPr/>
-        </p:nvSpPr>
-        <p:spPr>
-          <a:xfrm rot="5400000" flipH="1" flipV="1">
-            <a:off x="1617549" y="3244334"/>
-            <a:ext cx="964944" cy="369332"/>
-          </a:xfrm>
-          <a:prstGeom prst="rect">
-            <a:avLst/>
-          </a:prstGeom>
-          <a:noFill/>
-        </p:spPr>
-        <p:txBody>
-          <a:bodyPr wrap="none" rtlCol="0">
-            <a:spAutoFit/>
-          </a:bodyPr>
-          <a:lstStyle/>
-          <a:p>
-            <a:r>
-              <a:rPr lang="en-GB" dirty="0"/>
-              <a:t>Size (kb)</a:t>
-            </a:r>
-          </a:p>
-        </p:txBody>
-      </p:sp>
-      <p:sp>
-        <p:nvSpPr>
-          <p:cNvPr id="9" name="CasellaDiTesto 8">
-            <a:extLst>
-              <a:ext uri="{FF2B5EF4-FFF2-40B4-BE49-F238E27FC236}">
-                <a16:creationId xmlns:a16="http://schemas.microsoft.com/office/drawing/2014/main" id="{75591D44-0837-4B4A-A9E8-A8E6EDE6EF3C}"/>
-              </a:ext>
-            </a:extLst>
-          </p:cNvPr>
-          <p:cNvSpPr txBox="1"/>
-          <p:nvPr/>
-        </p:nvSpPr>
-        <p:spPr>
-          <a:xfrm>
-            <a:off x="5584449" y="5940923"/>
-            <a:ext cx="1553117" cy="369332"/>
-          </a:xfrm>
-          <a:prstGeom prst="rect">
-            <a:avLst/>
-          </a:prstGeom>
-          <a:noFill/>
-        </p:spPr>
-        <p:txBody>
-          <a:bodyPr wrap="none" rtlCol="0">
-            <a:spAutoFit/>
-          </a:bodyPr>
-          <a:lstStyle/>
-          <a:p>
-            <a:r>
-              <a:rPr lang="en-GB" dirty="0"/>
-              <a:t>Inference time</a:t>
-            </a:r>
-          </a:p>
-        </p:txBody>
-      </p:sp>
-    </p:spTree>
-    <p:extLst>
-      <p:ext uri="{BB962C8B-B14F-4D97-AF65-F5344CB8AC3E}">
-        <p14:creationId xmlns:p14="http://schemas.microsoft.com/office/powerpoint/2010/main" val="2791445916"/>
-      </p:ext>
-    </p:extLst>
-  </p:cSld>
-  <p:clrMapOvr>
-    <a:masterClrMapping/>
-  </p:clrMapOvr>
-</p:sld>
-</file>
-
-<file path=ppt/slides/slide13.xml><?xml version="1.0" encoding="utf-8"?>
-<p:sld xmlns:a="http://schemas.openxmlformats.org/drawingml/2006/main" xmlns:r="http://schemas.openxmlformats.org/officeDocument/2006/relationships" xmlns:p="http://schemas.openxmlformats.org/presentationml/2006/main">
-  <p:cSld>
-    <p:spTree>
-      <p:nvGrpSpPr>
-        <p:cNvPr id="1" name=""/>
-        <p:cNvGrpSpPr/>
-        <p:nvPr/>
-      </p:nvGrpSpPr>
-      <p:grpSpPr>
-        <a:xfrm>
-          <a:off x="0" y="0"/>
-          <a:ext cx="0" cy="0"/>
-          <a:chOff x="0" y="0"/>
-          <a:chExt cx="0" cy="0"/>
-        </a:xfrm>
-      </p:grpSpPr>
-      <p:sp>
-        <p:nvSpPr>
-          <p:cNvPr id="2" name="Titolo 1">
-            <a:extLst>
-              <a:ext uri="{FF2B5EF4-FFF2-40B4-BE49-F238E27FC236}">
-                <a16:creationId xmlns:a16="http://schemas.microsoft.com/office/drawing/2014/main" id="{2A31F789-F73A-2E4B-AA7C-07F6B5DC53A5}"/>
-              </a:ext>
-            </a:extLst>
-          </p:cNvPr>
-          <p:cNvSpPr>
-            <a:spLocks noGrp="1"/>
-          </p:cNvSpPr>
-          <p:nvPr>
-            <p:ph type="title"/>
-          </p:nvPr>
-        </p:nvSpPr>
-        <p:spPr/>
-        <p:txBody>
-          <a:bodyPr/>
-          <a:lstStyle/>
-          <a:p>
-            <a:endParaRPr lang="en-GB" dirty="0"/>
-          </a:p>
-        </p:txBody>
-      </p:sp>
-      <p:sp>
-        <p:nvSpPr>
-          <p:cNvPr id="3" name="Segnaposto contenuto 2">
-            <a:extLst>
-              <a:ext uri="{FF2B5EF4-FFF2-40B4-BE49-F238E27FC236}">
-                <a16:creationId xmlns:a16="http://schemas.microsoft.com/office/drawing/2014/main" id="{A92B7755-9699-B145-8872-C18BFAABABD2}"/>
-              </a:ext>
-            </a:extLst>
-          </p:cNvPr>
-          <p:cNvSpPr>
-            <a:spLocks noGrp="1"/>
-          </p:cNvSpPr>
-          <p:nvPr>
-            <p:ph idx="1"/>
-          </p:nvPr>
-        </p:nvSpPr>
-        <p:spPr/>
-        <p:txBody>
-          <a:bodyPr/>
-          <a:lstStyle/>
-          <a:p>
-            <a:pPr>
-              <a:lnSpc>
-                <a:spcPct val="150000"/>
-              </a:lnSpc>
-            </a:pPr>
-            <a:r>
-              <a:rPr lang="en-GB" dirty="0"/>
-              <a:t>The attributes of the pictures influence inference time</a:t>
-            </a:r>
-          </a:p>
-          <a:p>
-            <a:pPr lvl="1">
-              <a:lnSpc>
-                <a:spcPct val="100000"/>
-              </a:lnSpc>
-            </a:pPr>
-            <a:r>
-              <a:rPr lang="en-GB" dirty="0"/>
-              <a:t>Resolution</a:t>
-            </a:r>
-          </a:p>
-          <a:p>
-            <a:pPr lvl="1">
-              <a:lnSpc>
-                <a:spcPct val="100000"/>
-              </a:lnSpc>
-            </a:pPr>
-            <a:r>
-              <a:rPr lang="en-GB" dirty="0"/>
-              <a:t>Dimensions </a:t>
-            </a:r>
-          </a:p>
-          <a:p>
-            <a:pPr>
-              <a:lnSpc>
-                <a:spcPct val="200000"/>
-              </a:lnSpc>
-            </a:pPr>
-            <a:r>
-              <a:rPr lang="en-GB" dirty="0"/>
-              <a:t>If so, we expect bigger pictures to take more time</a:t>
-            </a:r>
-          </a:p>
-          <a:p>
-            <a:endParaRPr lang="en-GB" dirty="0"/>
-          </a:p>
-        </p:txBody>
-      </p:sp>
-      <p:sp>
-        <p:nvSpPr>
-          <p:cNvPr id="4" name="Segnaposto numero diapositiva 3">
-            <a:extLst>
-              <a:ext uri="{FF2B5EF4-FFF2-40B4-BE49-F238E27FC236}">
-                <a16:creationId xmlns:a16="http://schemas.microsoft.com/office/drawing/2014/main" id="{BECB87CF-D11D-CE4C-9C3B-B912122C7BF8}"/>
-              </a:ext>
-            </a:extLst>
-          </p:cNvPr>
-          <p:cNvSpPr>
-            <a:spLocks noGrp="1"/>
-          </p:cNvSpPr>
-          <p:nvPr>
-            <p:ph type="sldNum" sz="quarter" idx="4"/>
-          </p:nvPr>
-        </p:nvSpPr>
-        <p:spPr/>
-        <p:txBody>
-          <a:bodyPr/>
-          <a:lstStyle/>
-          <a:p>
-            <a:fld id="{3CA77444-643D-DC4A-BC90-63FB0CFBEC9C}" type="slidenum">
-              <a:rPr lang="en-US" smtClean="0"/>
-              <a:pPr/>
-              <a:t>13</a:t>
-            </a:fld>
-            <a:endParaRPr lang="en-US" dirty="0"/>
-          </a:p>
-        </p:txBody>
-      </p:sp>
-      <p:sp>
-        <p:nvSpPr>
-          <p:cNvPr id="5" name="Segnaposto data 4">
-            <a:extLst>
-              <a:ext uri="{FF2B5EF4-FFF2-40B4-BE49-F238E27FC236}">
-                <a16:creationId xmlns:a16="http://schemas.microsoft.com/office/drawing/2014/main" id="{71AE1F84-F179-6940-BFBB-EC15DA12B5A6}"/>
-              </a:ext>
-            </a:extLst>
-          </p:cNvPr>
-          <p:cNvSpPr>
-            <a:spLocks noGrp="1"/>
-          </p:cNvSpPr>
-          <p:nvPr>
-            <p:ph type="dt" sz="half" idx="2"/>
-          </p:nvPr>
-        </p:nvSpPr>
-        <p:spPr/>
-        <p:txBody>
-          <a:bodyPr/>
-          <a:lstStyle/>
-          <a:p>
-            <a:r>
-              <a:rPr lang="en-US"/>
-              <a:t>Luca Brodo - HSHL</a:t>
-            </a:r>
-            <a:endParaRPr lang="en-US" dirty="0"/>
-          </a:p>
-        </p:txBody>
-      </p:sp>
-    </p:spTree>
-    <p:extLst>
-      <p:ext uri="{BB962C8B-B14F-4D97-AF65-F5344CB8AC3E}">
-        <p14:creationId xmlns:p14="http://schemas.microsoft.com/office/powerpoint/2010/main" val="2356051592"/>
-      </p:ext>
-    </p:extLst>
-  </p:cSld>
-  <p:clrMapOvr>
-    <a:masterClrMapping/>
-  </p:clrMapOvr>
-</p:sld>
-</file>
-
-<file path=ppt/slides/slide14.xml><?xml version="1.0" encoding="utf-8"?>
-<p:sld xmlns:a="http://schemas.openxmlformats.org/drawingml/2006/main" xmlns:r="http://schemas.openxmlformats.org/officeDocument/2006/relationships" xmlns:p="http://schemas.openxmlformats.org/presentationml/2006/main">
-  <p:cSld>
-    <p:spTree>
-      <p:nvGrpSpPr>
-        <p:cNvPr id="1" name=""/>
-        <p:cNvGrpSpPr/>
-        <p:nvPr/>
-      </p:nvGrpSpPr>
-      <p:grpSpPr>
-        <a:xfrm>
-          <a:off x="0" y="0"/>
-          <a:ext cx="0" cy="0"/>
-          <a:chOff x="0" y="0"/>
-          <a:chExt cx="0" cy="0"/>
-        </a:xfrm>
-      </p:grpSpPr>
-      <p:sp>
-        <p:nvSpPr>
-          <p:cNvPr id="2" name="Titolo 1">
-            <a:extLst>
-              <a:ext uri="{FF2B5EF4-FFF2-40B4-BE49-F238E27FC236}">
-                <a16:creationId xmlns:a16="http://schemas.microsoft.com/office/drawing/2014/main" id="{56E5445D-D492-0D43-93CF-B9B22C9AFB77}"/>
-              </a:ext>
-            </a:extLst>
-          </p:cNvPr>
-          <p:cNvSpPr>
-            <a:spLocks noGrp="1"/>
-          </p:cNvSpPr>
-          <p:nvPr>
-            <p:ph type="title"/>
-          </p:nvPr>
-        </p:nvSpPr>
-        <p:spPr>
-          <a:xfrm>
-            <a:off x="838200" y="182619"/>
-            <a:ext cx="10515600" cy="1325563"/>
-          </a:xfrm>
-        </p:spPr>
-        <p:txBody>
-          <a:bodyPr/>
-          <a:lstStyle/>
-          <a:p>
-            <a:r>
-              <a:rPr lang="en-GB" dirty="0"/>
-              <a:t>Conclusion</a:t>
-            </a:r>
-          </a:p>
-        </p:txBody>
-      </p:sp>
-      <p:sp>
-        <p:nvSpPr>
-          <p:cNvPr id="3" name="Segnaposto contenuto 2">
-            <a:extLst>
-              <a:ext uri="{FF2B5EF4-FFF2-40B4-BE49-F238E27FC236}">
-                <a16:creationId xmlns:a16="http://schemas.microsoft.com/office/drawing/2014/main" id="{23208D79-EC64-0440-92D7-8B10863DCA54}"/>
-              </a:ext>
-            </a:extLst>
-          </p:cNvPr>
-          <p:cNvSpPr>
-            <a:spLocks noGrp="1"/>
-          </p:cNvSpPr>
-          <p:nvPr>
-            <p:ph idx="1"/>
-          </p:nvPr>
-        </p:nvSpPr>
-        <p:spPr>
-          <a:xfrm>
-            <a:off x="838200" y="1371600"/>
-            <a:ext cx="10515600" cy="4805363"/>
-          </a:xfrm>
-        </p:spPr>
-        <p:txBody>
-          <a:bodyPr>
-            <a:normAutofit lnSpcReduction="10000"/>
-          </a:bodyPr>
-          <a:lstStyle/>
-          <a:p>
-            <a:pPr marL="0" indent="0">
-              <a:lnSpc>
-                <a:spcPct val="150000"/>
-              </a:lnSpc>
-              <a:buNone/>
-            </a:pPr>
-            <a:r>
-              <a:rPr lang="en-GB" dirty="0"/>
-              <a:t>What else can we do?</a:t>
-            </a:r>
-          </a:p>
-          <a:p>
-            <a:pPr>
-              <a:lnSpc>
-                <a:spcPct val="200000"/>
-              </a:lnSpc>
-            </a:pPr>
-            <a:r>
-              <a:rPr lang="en-GB" dirty="0"/>
-              <a:t>Finding more characteristics</a:t>
-            </a:r>
-          </a:p>
-          <a:p>
-            <a:pPr>
-              <a:lnSpc>
-                <a:spcPct val="200000"/>
-              </a:lnSpc>
-            </a:pPr>
-            <a:r>
-              <a:rPr lang="en-GB" dirty="0"/>
-              <a:t>Finding more correlations</a:t>
-            </a:r>
-          </a:p>
-          <a:p>
-            <a:pPr>
-              <a:lnSpc>
-                <a:spcPct val="170000"/>
-              </a:lnSpc>
-            </a:pPr>
-            <a:r>
-              <a:rPr lang="en-GB" dirty="0"/>
-              <a:t>Study input images </a:t>
-            </a:r>
-          </a:p>
-          <a:p>
-            <a:pPr lvl="1">
-              <a:lnSpc>
-                <a:spcPct val="110000"/>
-              </a:lnSpc>
-            </a:pPr>
-            <a:r>
-              <a:rPr lang="en-GB" dirty="0"/>
-              <a:t>Training images</a:t>
-            </a:r>
-          </a:p>
-          <a:p>
-            <a:pPr lvl="1">
-              <a:lnSpc>
-                <a:spcPct val="110000"/>
-              </a:lnSpc>
-            </a:pPr>
-            <a:r>
-              <a:rPr lang="en-GB" dirty="0"/>
-              <a:t>Finding characteristics of the images to use</a:t>
-            </a:r>
-          </a:p>
-          <a:p>
-            <a:pPr lvl="1">
-              <a:lnSpc>
-                <a:spcPct val="110000"/>
-              </a:lnSpc>
-            </a:pPr>
-            <a:r>
-              <a:rPr lang="en-GB" dirty="0"/>
-              <a:t>Develop a tool to automatically study these characteristics</a:t>
-            </a:r>
-          </a:p>
-          <a:p>
-            <a:endParaRPr lang="en-GB" dirty="0"/>
-          </a:p>
-        </p:txBody>
-      </p:sp>
-      <p:sp>
-        <p:nvSpPr>
-          <p:cNvPr id="4" name="Segnaposto numero diapositiva 3">
-            <a:extLst>
-              <a:ext uri="{FF2B5EF4-FFF2-40B4-BE49-F238E27FC236}">
-                <a16:creationId xmlns:a16="http://schemas.microsoft.com/office/drawing/2014/main" id="{58D8FCE9-C97A-1241-8125-E8CB47BB68B7}"/>
-              </a:ext>
-            </a:extLst>
-          </p:cNvPr>
-          <p:cNvSpPr>
-            <a:spLocks noGrp="1"/>
-          </p:cNvSpPr>
-          <p:nvPr>
-            <p:ph type="sldNum" sz="quarter" idx="4"/>
-          </p:nvPr>
-        </p:nvSpPr>
-        <p:spPr/>
-        <p:txBody>
-          <a:bodyPr/>
-          <a:lstStyle/>
-          <a:p>
-            <a:fld id="{3CA77444-643D-DC4A-BC90-63FB0CFBEC9C}" type="slidenum">
-              <a:rPr lang="en-US" smtClean="0"/>
-              <a:pPr/>
-              <a:t>14</a:t>
-            </a:fld>
-            <a:endParaRPr lang="en-US" dirty="0"/>
-          </a:p>
-        </p:txBody>
-      </p:sp>
-      <p:sp>
-        <p:nvSpPr>
-          <p:cNvPr id="5" name="Segnaposto data 4">
-            <a:extLst>
-              <a:ext uri="{FF2B5EF4-FFF2-40B4-BE49-F238E27FC236}">
-                <a16:creationId xmlns:a16="http://schemas.microsoft.com/office/drawing/2014/main" id="{B7414060-65B0-FD46-9987-C7A4AFFA4E58}"/>
-              </a:ext>
-            </a:extLst>
-          </p:cNvPr>
-          <p:cNvSpPr>
-            <a:spLocks noGrp="1"/>
-          </p:cNvSpPr>
-          <p:nvPr>
-            <p:ph type="dt" sz="half" idx="2"/>
-          </p:nvPr>
-        </p:nvSpPr>
-        <p:spPr/>
-        <p:txBody>
-          <a:bodyPr/>
-          <a:lstStyle/>
-          <a:p>
-            <a:r>
-              <a:rPr lang="en-US"/>
-              <a:t>Luca Brodo - HSHL</a:t>
-            </a:r>
-            <a:endParaRPr lang="en-US" dirty="0"/>
-          </a:p>
-        </p:txBody>
-      </p:sp>
-    </p:spTree>
-    <p:extLst>
-      <p:ext uri="{BB962C8B-B14F-4D97-AF65-F5344CB8AC3E}">
-        <p14:creationId xmlns:p14="http://schemas.microsoft.com/office/powerpoint/2010/main" val="223653232"/>
-      </p:ext>
-    </p:extLst>
-  </p:cSld>
-  <p:clrMapOvr>
-    <a:masterClrMapping/>
-  </p:clrMapOvr>
-</p:sld>
-</file>
-
 <file path=ppt/slides/slide15.xml><?xml version="1.0" encoding="utf-8"?>
 <p:sld xmlns:a="http://schemas.openxmlformats.org/drawingml/2006/main" xmlns:r="http://schemas.openxmlformats.org/officeDocument/2006/relationships" xmlns:p="http://schemas.openxmlformats.org/presentationml/2006/main">
   <p:cSld>
@@ -3199,7 +3680,7 @@
           <p:cNvPr id="2" name="Titolo 1">
             <a:extLst>
               <a:ext uri="{FF2B5EF4-FFF2-40B4-BE49-F238E27FC236}">
-                <a16:creationId xmlns:a16="http://schemas.microsoft.com/office/drawing/2014/main" id="{01F90A6F-1DEC-004D-8DDC-D19ECD5CF89F}"/>
+                <a16:creationId xmlns:a16="http://schemas.microsoft.com/office/drawing/2014/main" id="{6F99199E-F7CD-9642-B1D9-7E4B365AADD8}"/>
               </a:ext>
             </a:extLst>
           </p:cNvPr>
@@ -3215,9 +3696,232 @@
           <a:bodyPr/>
           <a:lstStyle/>
           <a:p>
-            <a:r>
-              <a:rPr lang="en-GB" dirty="0"/>
-              <a:t>Conclusion</a:t>
+            <a:endParaRPr lang="en-GB" dirty="0"/>
+          </a:p>
+        </p:txBody>
+      </p:sp>
+      <p:pic>
+        <p:nvPicPr>
+          <p:cNvPr id="7" name="Segnaposto contenuto 6">
+            <a:extLst>
+              <a:ext uri="{FF2B5EF4-FFF2-40B4-BE49-F238E27FC236}">
+                <a16:creationId xmlns:a16="http://schemas.microsoft.com/office/drawing/2014/main" id="{87D3EF76-524C-B54F-A574-8E778793D4E5}"/>
+              </a:ext>
+            </a:extLst>
+          </p:cNvPr>
+          <p:cNvPicPr>
+            <a:picLocks noGrp="1" noChangeAspect="1"/>
+          </p:cNvPicPr>
+          <p:nvPr>
+            <p:ph idx="1"/>
+          </p:nvPr>
+        </p:nvPicPr>
+        <p:blipFill>
+          <a:blip r:embed="rId2"/>
+          <a:stretch>
+            <a:fillRect/>
+          </a:stretch>
+        </p:blipFill>
+        <p:spPr>
+          <a:xfrm>
+            <a:off x="2284686" y="1690688"/>
+            <a:ext cx="7695180" cy="4351338"/>
+          </a:xfrm>
+        </p:spPr>
+      </p:pic>
+      <p:sp>
+        <p:nvSpPr>
+          <p:cNvPr id="4" name="Segnaposto numero diapositiva 3">
+            <a:extLst>
+              <a:ext uri="{FF2B5EF4-FFF2-40B4-BE49-F238E27FC236}">
+                <a16:creationId xmlns:a16="http://schemas.microsoft.com/office/drawing/2014/main" id="{E8E68C83-5B95-EC4C-8792-A579A80C8FC0}"/>
+              </a:ext>
+            </a:extLst>
+          </p:cNvPr>
+          <p:cNvSpPr>
+            <a:spLocks noGrp="1"/>
+          </p:cNvSpPr>
+          <p:nvPr>
+            <p:ph type="sldNum" sz="quarter" idx="4"/>
+          </p:nvPr>
+        </p:nvSpPr>
+        <p:spPr/>
+        <p:txBody>
+          <a:bodyPr/>
+          <a:lstStyle/>
+          <a:p>
+            <a:fld id="{3CA77444-643D-DC4A-BC90-63FB0CFBEC9C}" type="slidenum">
+              <a:rPr lang="en-US" smtClean="0"/>
+              <a:pPr/>
+              <a:t>15</a:t>
+            </a:fld>
+            <a:endParaRPr lang="en-US" dirty="0"/>
+          </a:p>
+        </p:txBody>
+      </p:sp>
+      <p:sp>
+        <p:nvSpPr>
+          <p:cNvPr id="5" name="Segnaposto data 4">
+            <a:extLst>
+              <a:ext uri="{FF2B5EF4-FFF2-40B4-BE49-F238E27FC236}">
+                <a16:creationId xmlns:a16="http://schemas.microsoft.com/office/drawing/2014/main" id="{50A70004-4C21-064F-A267-4F571D65970F}"/>
+              </a:ext>
+            </a:extLst>
+          </p:cNvPr>
+          <p:cNvSpPr>
+            <a:spLocks noGrp="1"/>
+          </p:cNvSpPr>
+          <p:nvPr>
+            <p:ph type="dt" sz="half" idx="2"/>
+          </p:nvPr>
+        </p:nvSpPr>
+        <p:spPr/>
+        <p:txBody>
+          <a:bodyPr/>
+          <a:lstStyle/>
+          <a:p>
+            <a:r>
+              <a:rPr lang="en-US"/>
+              <a:t>Luca Brodo - HSHL</a:t>
+            </a:r>
+            <a:endParaRPr lang="en-US" dirty="0"/>
+          </a:p>
+        </p:txBody>
+      </p:sp>
+      <p:sp>
+        <p:nvSpPr>
+          <p:cNvPr id="8" name="CasellaDiTesto 7">
+            <a:extLst>
+              <a:ext uri="{FF2B5EF4-FFF2-40B4-BE49-F238E27FC236}">
+                <a16:creationId xmlns:a16="http://schemas.microsoft.com/office/drawing/2014/main" id="{B11109DD-4E13-004A-AD46-BD7214094904}"/>
+              </a:ext>
+            </a:extLst>
+          </p:cNvPr>
+          <p:cNvSpPr txBox="1"/>
+          <p:nvPr/>
+        </p:nvSpPr>
+        <p:spPr>
+          <a:xfrm rot="5400000" flipH="1" flipV="1">
+            <a:off x="1617549" y="3244334"/>
+            <a:ext cx="964944" cy="369332"/>
+          </a:xfrm>
+          <a:prstGeom prst="rect">
+            <a:avLst/>
+          </a:prstGeom>
+          <a:noFill/>
+        </p:spPr>
+        <p:txBody>
+          <a:bodyPr wrap="none" rtlCol="0">
+            <a:spAutoFit/>
+          </a:bodyPr>
+          <a:lstStyle/>
+          <a:p>
+            <a:r>
+              <a:rPr lang="en-GB" dirty="0"/>
+              <a:t>Size (kb)</a:t>
+            </a:r>
+          </a:p>
+        </p:txBody>
+      </p:sp>
+      <p:sp>
+        <p:nvSpPr>
+          <p:cNvPr id="9" name="CasellaDiTesto 8">
+            <a:extLst>
+              <a:ext uri="{FF2B5EF4-FFF2-40B4-BE49-F238E27FC236}">
+                <a16:creationId xmlns:a16="http://schemas.microsoft.com/office/drawing/2014/main" id="{75591D44-0837-4B4A-A9E8-A8E6EDE6EF3C}"/>
+              </a:ext>
+            </a:extLst>
+          </p:cNvPr>
+          <p:cNvSpPr txBox="1"/>
+          <p:nvPr/>
+        </p:nvSpPr>
+        <p:spPr>
+          <a:xfrm>
+            <a:off x="5584449" y="5940923"/>
+            <a:ext cx="1553117" cy="369332"/>
+          </a:xfrm>
+          <a:prstGeom prst="rect">
+            <a:avLst/>
+          </a:prstGeom>
+          <a:noFill/>
+        </p:spPr>
+        <p:txBody>
+          <a:bodyPr wrap="none" rtlCol="0">
+            <a:spAutoFit/>
+          </a:bodyPr>
+          <a:lstStyle/>
+          <a:p>
+            <a:r>
+              <a:rPr lang="en-GB" dirty="0"/>
+              <a:t>Inference time</a:t>
+            </a:r>
+          </a:p>
+        </p:txBody>
+      </p:sp>
+    </p:spTree>
+    <p:extLst>
+      <p:ext uri="{BB962C8B-B14F-4D97-AF65-F5344CB8AC3E}">
+        <p14:creationId xmlns:p14="http://schemas.microsoft.com/office/powerpoint/2010/main" val="2791445916"/>
+      </p:ext>
+    </p:extLst>
+  </p:cSld>
+  <p:clrMapOvr>
+    <a:masterClrMapping/>
+  </p:clrMapOvr>
+</p:sld>
+</file>
+
+<file path=ppt/slides/slide16.xml><?xml version="1.0" encoding="utf-8"?>
+<p:sld xmlns:a="http://schemas.openxmlformats.org/drawingml/2006/main" xmlns:r="http://schemas.openxmlformats.org/officeDocument/2006/relationships" xmlns:p="http://schemas.openxmlformats.org/presentationml/2006/main">
+  <p:cSld>
+    <p:spTree>
+      <p:nvGrpSpPr>
+        <p:cNvPr id="1" name=""/>
+        <p:cNvGrpSpPr/>
+        <p:nvPr/>
+      </p:nvGrpSpPr>
+      <p:grpSpPr>
+        <a:xfrm>
+          <a:off x="0" y="0"/>
+          <a:ext cx="0" cy="0"/>
+          <a:chOff x="0" y="0"/>
+          <a:chExt cx="0" cy="0"/>
+        </a:xfrm>
+      </p:grpSpPr>
+      <p:sp>
+        <p:nvSpPr>
+          <p:cNvPr id="2" name="Titolo 1">
+            <a:extLst>
+              <a:ext uri="{FF2B5EF4-FFF2-40B4-BE49-F238E27FC236}">
+                <a16:creationId xmlns:a16="http://schemas.microsoft.com/office/drawing/2014/main" id="{56E5445D-D492-0D43-93CF-B9B22C9AFB77}"/>
+              </a:ext>
+            </a:extLst>
+          </p:cNvPr>
+          <p:cNvSpPr>
+            <a:spLocks noGrp="1"/>
+          </p:cNvSpPr>
+          <p:nvPr>
+            <p:ph type="title"/>
+          </p:nvPr>
+        </p:nvSpPr>
+        <p:spPr>
+          <a:xfrm>
+            <a:off x="838200" y="182619"/>
+            <a:ext cx="10515600" cy="1325563"/>
+          </a:xfrm>
+        </p:spPr>
+        <p:txBody>
+          <a:bodyPr/>
+          <a:lstStyle/>
+          <a:p>
+            <a:pPr>
+              <a:lnSpc>
+                <a:spcPct val="150000"/>
+              </a:lnSpc>
+            </a:pPr>
+            <a:r>
+              <a:rPr lang="en-GB" dirty="0"/>
+              <a:t>What else can we do?</a:t>
             </a:r>
           </a:p>
         </p:txBody>
@@ -3227,7 +3931,7 @@
           <p:cNvPr id="3" name="Segnaposto contenuto 2">
             <a:extLst>
               <a:ext uri="{FF2B5EF4-FFF2-40B4-BE49-F238E27FC236}">
-                <a16:creationId xmlns:a16="http://schemas.microsoft.com/office/drawing/2014/main" id="{32E65B6D-B1B5-2244-8650-5476948E4C85}"/>
+                <a16:creationId xmlns:a16="http://schemas.microsoft.com/office/drawing/2014/main" id="{23208D79-EC64-0440-92D7-8B10863DCA54}"/>
               </a:ext>
             </a:extLst>
           </p:cNvPr>
@@ -3238,9 +3942,16 @@
             <p:ph idx="1"/>
           </p:nvPr>
         </p:nvSpPr>
-        <p:spPr/>
-        <p:txBody>
-          <a:bodyPr/>
+        <p:spPr>
+          <a:xfrm>
+            <a:off x="838200" y="1371600"/>
+            <a:ext cx="10515600" cy="4805363"/>
+          </a:xfrm>
+        </p:spPr>
+        <p:txBody>
+          <a:bodyPr>
+            <a:normAutofit fontScale="92500" lnSpcReduction="10000"/>
+          </a:bodyPr>
           <a:lstStyle/>
           <a:p>
             <a:pPr>
@@ -3250,7 +3961,7 @@
             </a:pPr>
             <a:r>
               <a:rPr lang="en-GB" dirty="0"/>
-              <a:t>How can we optimize applications with this method?</a:t>
+              <a:t>Identify more correlations </a:t>
             </a:r>
           </a:p>
           <a:p>
@@ -3261,7 +3972,7 @@
             </a:pPr>
             <a:r>
               <a:rPr lang="en-GB" dirty="0"/>
-              <a:t>Can we create contracts using these correlations?</a:t>
+              <a:t>How can we optimize applications with this method?</a:t>
             </a:r>
           </a:p>
           <a:p>
@@ -3272,9 +3983,200 @@
             </a:pPr>
             <a:r>
               <a:rPr lang="en-GB" dirty="0"/>
-              <a:t>First milestone to make sugar beet recognition more efficient</a:t>
-            </a:r>
-          </a:p>
+              <a:t>Can we create contracts using these correlations?</a:t>
+            </a:r>
+          </a:p>
+          <a:p>
+            <a:pPr>
+              <a:lnSpc>
+                <a:spcPct val="170000"/>
+              </a:lnSpc>
+            </a:pPr>
+            <a:r>
+              <a:rPr lang="en-GB" dirty="0"/>
+              <a:t>Study input images </a:t>
+            </a:r>
+          </a:p>
+          <a:p>
+            <a:pPr lvl="1">
+              <a:lnSpc>
+                <a:spcPct val="110000"/>
+              </a:lnSpc>
+            </a:pPr>
+            <a:r>
+              <a:rPr lang="en-GB" dirty="0"/>
+              <a:t>Training images</a:t>
+            </a:r>
+          </a:p>
+          <a:p>
+            <a:pPr lvl="1">
+              <a:lnSpc>
+                <a:spcPct val="110000"/>
+              </a:lnSpc>
+            </a:pPr>
+            <a:r>
+              <a:rPr lang="en-GB" dirty="0"/>
+              <a:t>Finding characteristics of the images to use</a:t>
+            </a:r>
+          </a:p>
+          <a:p>
+            <a:pPr lvl="1">
+              <a:lnSpc>
+                <a:spcPct val="110000"/>
+              </a:lnSpc>
+            </a:pPr>
+            <a:r>
+              <a:rPr lang="en-GB" dirty="0"/>
+              <a:t>Develop a tool to automatically study these characteristics</a:t>
+            </a:r>
+          </a:p>
+          <a:p>
+            <a:endParaRPr lang="en-GB" dirty="0"/>
+          </a:p>
+        </p:txBody>
+      </p:sp>
+      <p:sp>
+        <p:nvSpPr>
+          <p:cNvPr id="4" name="Segnaposto numero diapositiva 3">
+            <a:extLst>
+              <a:ext uri="{FF2B5EF4-FFF2-40B4-BE49-F238E27FC236}">
+                <a16:creationId xmlns:a16="http://schemas.microsoft.com/office/drawing/2014/main" id="{58D8FCE9-C97A-1241-8125-E8CB47BB68B7}"/>
+              </a:ext>
+            </a:extLst>
+          </p:cNvPr>
+          <p:cNvSpPr>
+            <a:spLocks noGrp="1"/>
+          </p:cNvSpPr>
+          <p:nvPr>
+            <p:ph type="sldNum" sz="quarter" idx="4"/>
+          </p:nvPr>
+        </p:nvSpPr>
+        <p:spPr/>
+        <p:txBody>
+          <a:bodyPr/>
+          <a:lstStyle/>
+          <a:p>
+            <a:fld id="{3CA77444-643D-DC4A-BC90-63FB0CFBEC9C}" type="slidenum">
+              <a:rPr lang="en-US" smtClean="0"/>
+              <a:pPr/>
+              <a:t>16</a:t>
+            </a:fld>
+            <a:endParaRPr lang="en-US" dirty="0"/>
+          </a:p>
+        </p:txBody>
+      </p:sp>
+      <p:sp>
+        <p:nvSpPr>
+          <p:cNvPr id="5" name="Segnaposto data 4">
+            <a:extLst>
+              <a:ext uri="{FF2B5EF4-FFF2-40B4-BE49-F238E27FC236}">
+                <a16:creationId xmlns:a16="http://schemas.microsoft.com/office/drawing/2014/main" id="{B7414060-65B0-FD46-9987-C7A4AFFA4E58}"/>
+              </a:ext>
+            </a:extLst>
+          </p:cNvPr>
+          <p:cNvSpPr>
+            <a:spLocks noGrp="1"/>
+          </p:cNvSpPr>
+          <p:nvPr>
+            <p:ph type="dt" sz="half" idx="2"/>
+          </p:nvPr>
+        </p:nvSpPr>
+        <p:spPr/>
+        <p:txBody>
+          <a:bodyPr/>
+          <a:lstStyle/>
+          <a:p>
+            <a:r>
+              <a:rPr lang="en-US"/>
+              <a:t>Luca Brodo - HSHL</a:t>
+            </a:r>
+            <a:endParaRPr lang="en-US" dirty="0"/>
+          </a:p>
+        </p:txBody>
+      </p:sp>
+    </p:spTree>
+    <p:extLst>
+      <p:ext uri="{BB962C8B-B14F-4D97-AF65-F5344CB8AC3E}">
+        <p14:creationId xmlns:p14="http://schemas.microsoft.com/office/powerpoint/2010/main" val="223653232"/>
+      </p:ext>
+    </p:extLst>
+  </p:cSld>
+  <p:clrMapOvr>
+    <a:masterClrMapping/>
+  </p:clrMapOvr>
+</p:sld>
+</file>
+
+<file path=ppt/slides/slide17.xml><?xml version="1.0" encoding="utf-8"?>
+<p:sld xmlns:a="http://schemas.openxmlformats.org/drawingml/2006/main" xmlns:r="http://schemas.openxmlformats.org/officeDocument/2006/relationships" xmlns:p="http://schemas.openxmlformats.org/presentationml/2006/main">
+  <p:cSld>
+    <p:spTree>
+      <p:nvGrpSpPr>
+        <p:cNvPr id="1" name=""/>
+        <p:cNvGrpSpPr/>
+        <p:nvPr/>
+      </p:nvGrpSpPr>
+      <p:grpSpPr>
+        <a:xfrm>
+          <a:off x="0" y="0"/>
+          <a:ext cx="0" cy="0"/>
+          <a:chOff x="0" y="0"/>
+          <a:chExt cx="0" cy="0"/>
+        </a:xfrm>
+      </p:grpSpPr>
+      <p:sp>
+        <p:nvSpPr>
+          <p:cNvPr id="2" name="Titolo 1">
+            <a:extLst>
+              <a:ext uri="{FF2B5EF4-FFF2-40B4-BE49-F238E27FC236}">
+                <a16:creationId xmlns:a16="http://schemas.microsoft.com/office/drawing/2014/main" id="{01F90A6F-1DEC-004D-8DDC-D19ECD5CF89F}"/>
+              </a:ext>
+            </a:extLst>
+          </p:cNvPr>
+          <p:cNvSpPr>
+            <a:spLocks noGrp="1"/>
+          </p:cNvSpPr>
+          <p:nvPr>
+            <p:ph type="title"/>
+          </p:nvPr>
+        </p:nvSpPr>
+        <p:spPr/>
+        <p:txBody>
+          <a:bodyPr/>
+          <a:lstStyle/>
+          <a:p>
+            <a:pPr>
+              <a:lnSpc>
+                <a:spcPct val="150000"/>
+              </a:lnSpc>
+            </a:pPr>
+            <a:r>
+              <a:rPr lang="en-GB" dirty="0"/>
+              <a:t>Conclusion</a:t>
+            </a:r>
+          </a:p>
+        </p:txBody>
+      </p:sp>
+      <p:sp>
+        <p:nvSpPr>
+          <p:cNvPr id="3" name="Segnaposto contenuto 2">
+            <a:extLst>
+              <a:ext uri="{FF2B5EF4-FFF2-40B4-BE49-F238E27FC236}">
+                <a16:creationId xmlns:a16="http://schemas.microsoft.com/office/drawing/2014/main" id="{32E65B6D-B1B5-2244-8650-5476948E4C85}"/>
+              </a:ext>
+            </a:extLst>
+          </p:cNvPr>
+          <p:cNvSpPr>
+            <a:spLocks noGrp="1"/>
+          </p:cNvSpPr>
+          <p:nvPr>
+            <p:ph idx="1"/>
+          </p:nvPr>
+        </p:nvSpPr>
+        <p:spPr/>
+        <p:txBody>
+          <a:bodyPr/>
+          <a:lstStyle/>
           <a:p>
             <a:pPr>
               <a:lnSpc>
@@ -3283,13 +4185,19 @@
             </a:pPr>
             <a:r>
               <a:rPr lang="en-GB" dirty="0"/>
-              <a:t>Promising research field with a lot </a:t>
-            </a:r>
-            <a:r>
-              <a:rPr lang="en-GB"/>
-              <a:t>of potential</a:t>
-            </a:r>
-            <a:endParaRPr lang="en-GB" dirty="0"/>
+              <a:t>First milestone to make sugar beet recognition more efficient</a:t>
+            </a:r>
+          </a:p>
+          <a:p>
+            <a:pPr>
+              <a:lnSpc>
+                <a:spcPct val="200000"/>
+              </a:lnSpc>
+            </a:pPr>
+            <a:r>
+              <a:rPr lang="en-GB" dirty="0"/>
+              <a:t>Promising research field with a lot of potential</a:t>
+            </a:r>
           </a:p>
           <a:p>
             <a:endParaRPr lang="en-GB" dirty="0"/>
@@ -3320,7 +4228,7 @@
             <a:fld id="{3CA77444-643D-DC4A-BC90-63FB0CFBEC9C}" type="slidenum">
               <a:rPr lang="en-US" smtClean="0"/>
               <a:pPr/>
-              <a:t>15</a:t>
+              <a:t>17</a:t>
             </a:fld>
             <a:endParaRPr lang="en-US" dirty="0"/>
           </a:p>
@@ -3368,7 +4276,7 @@
 </p:sld>
 </file>
 
-<file path=ppt/slides/slide16.xml><?xml version="1.0" encoding="utf-8"?>
+<file path=ppt/slides/slide18.xml><?xml version="1.0" encoding="utf-8"?>
 <p:sld xmlns:a="http://schemas.openxmlformats.org/drawingml/2006/main" xmlns:r="http://schemas.openxmlformats.org/officeDocument/2006/relationships" xmlns:p="http://schemas.openxmlformats.org/presentationml/2006/main" show="0">
   <p:cSld>
     <p:spTree>
@@ -3434,9 +4342,18 @@
           <a:bodyPr/>
           <a:lstStyle/>
           <a:p>
-            <a:pPr marL="0" indent="0">
-              <a:buNone/>
+            <a:pPr marL="514350" indent="-514350">
+              <a:buFont typeface="+mj-lt"/>
+              <a:buAutoNum type="arabicPeriod"/>
             </a:pPr>
+            <a:r>
+              <a:rPr lang="it-IT" dirty="0" err="1"/>
+              <a:t>Swiss</a:t>
+            </a:r>
+            <a:r>
+              <a:rPr lang="it-IT" dirty="0"/>
+              <a:t> Sugar Ltd</a:t>
+            </a:r>
             <a:endParaRPr lang="en-GB" dirty="0"/>
           </a:p>
         </p:txBody>
@@ -3465,7 +4382,7 @@
             <a:fld id="{3CA77444-643D-DC4A-BC90-63FB0CFBEC9C}" type="slidenum">
               <a:rPr lang="en-US" smtClean="0"/>
               <a:pPr/>
-              <a:t>16</a:t>
+              <a:t>18</a:t>
             </a:fld>
             <a:endParaRPr lang="en-US" dirty="0"/>
           </a:p>
@@ -3584,39 +4501,21 @@
           <a:bodyPr/>
           <a:lstStyle/>
           <a:p>
-            <a:pPr>
+            <a:pPr marL="0" indent="0">
               <a:lnSpc>
                 <a:spcPct val="100000"/>
               </a:lnSpc>
+              <a:buNone/>
             </a:pPr>
-            <a:r>
-              <a:rPr lang="en-GB" dirty="0"/>
-              <a:t>We want to find correlations between the characteristics of Neural Networks. </a:t>
-            </a:r>
-          </a:p>
-          <a:p>
-            <a:pPr>
+            <a:endParaRPr lang="en-GB" dirty="0"/>
+          </a:p>
+          <a:p>
+            <a:pPr marL="0" indent="0">
               <a:lnSpc>
-                <a:spcPct val="200000"/>
+                <a:spcPct val="100000"/>
               </a:lnSpc>
+              <a:buNone/>
             </a:pPr>
-            <a:r>
-              <a:rPr lang="en-GB" dirty="0"/>
-              <a:t>In the settings of sugar beet production</a:t>
-            </a:r>
-          </a:p>
-          <a:p>
-            <a:pPr>
-              <a:lnSpc>
-                <a:spcPct val="200000"/>
-              </a:lnSpc>
-            </a:pPr>
-            <a:r>
-              <a:rPr lang="en-GB" dirty="0"/>
-              <a:t>Why sugar beets?</a:t>
-            </a:r>
-          </a:p>
-          <a:p>
             <a:endParaRPr lang="en-GB" dirty="0"/>
           </a:p>
         </p:txBody>
@@ -3677,6 +4576,71 @@
               <a:t>Luca Brodo - HSHL</a:t>
             </a:r>
             <a:endParaRPr lang="en-US" dirty="0"/>
+          </a:p>
+        </p:txBody>
+      </p:sp>
+      <p:pic>
+        <p:nvPicPr>
+          <p:cNvPr id="8" name="Immagine 7">
+            <a:extLst>
+              <a:ext uri="{FF2B5EF4-FFF2-40B4-BE49-F238E27FC236}">
+                <a16:creationId xmlns:a16="http://schemas.microsoft.com/office/drawing/2014/main" id="{3D111C80-841D-7746-BCC1-9AEC29A1DA9D}"/>
+              </a:ext>
+            </a:extLst>
+          </p:cNvPr>
+          <p:cNvPicPr>
+            <a:picLocks noChangeAspect="1"/>
+          </p:cNvPicPr>
+          <p:nvPr/>
+        </p:nvPicPr>
+        <p:blipFill>
+          <a:blip r:embed="rId2"/>
+          <a:stretch>
+            <a:fillRect/>
+          </a:stretch>
+        </p:blipFill>
+        <p:spPr>
+          <a:xfrm>
+            <a:off x="1922929" y="1482258"/>
+            <a:ext cx="8346141" cy="4694704"/>
+          </a:xfrm>
+          <a:prstGeom prst="rect">
+            <a:avLst/>
+          </a:prstGeom>
+        </p:spPr>
+      </p:pic>
+      <p:sp>
+        <p:nvSpPr>
+          <p:cNvPr id="9" name="CasellaDiTesto 8">
+            <a:extLst>
+              <a:ext uri="{FF2B5EF4-FFF2-40B4-BE49-F238E27FC236}">
+                <a16:creationId xmlns:a16="http://schemas.microsoft.com/office/drawing/2014/main" id="{FF007B68-76DC-BB4D-B406-6AA06EE9EC7C}"/>
+              </a:ext>
+            </a:extLst>
+          </p:cNvPr>
+          <p:cNvSpPr txBox="1"/>
+          <p:nvPr/>
+        </p:nvSpPr>
+        <p:spPr>
+          <a:xfrm>
+            <a:off x="10269070" y="5807630"/>
+            <a:ext cx="442750" cy="369332"/>
+          </a:xfrm>
+          <a:prstGeom prst="rect">
+            <a:avLst/>
+          </a:prstGeom>
+          <a:noFill/>
+        </p:spPr>
+        <p:txBody>
+          <a:bodyPr wrap="none" rtlCol="0">
+            <a:spAutoFit/>
+          </a:bodyPr>
+          <a:lstStyle/>
+          <a:p>
+            <a:r>
+              <a:rPr lang="en-GB" dirty="0"/>
+              <a:t>(1)</a:t>
+            </a:r>
           </a:p>
         </p:txBody>
       </p:sp>
@@ -3715,7 +4679,7 @@
           <p:cNvPr id="2" name="Titolo 1">
             <a:extLst>
               <a:ext uri="{FF2B5EF4-FFF2-40B4-BE49-F238E27FC236}">
-                <a16:creationId xmlns:a16="http://schemas.microsoft.com/office/drawing/2014/main" id="{FC99BB8B-D199-F441-B9FA-1DBA7CE36B98}"/>
+                <a16:creationId xmlns:a16="http://schemas.microsoft.com/office/drawing/2014/main" id="{F9BCDFE8-5DDA-2643-97E2-6F064554BBCC}"/>
               </a:ext>
             </a:extLst>
           </p:cNvPr>
@@ -3733,7 +4697,7 @@
           <a:p>
             <a:r>
               <a:rPr lang="en-GB" dirty="0"/>
-              <a:t>How are we going to do that?</a:t>
+              <a:t>Why are we here?</a:t>
             </a:r>
           </a:p>
         </p:txBody>
@@ -3743,7 +4707,7 @@
           <p:cNvPr id="3" name="Segnaposto contenuto 2">
             <a:extLst>
               <a:ext uri="{FF2B5EF4-FFF2-40B4-BE49-F238E27FC236}">
-                <a16:creationId xmlns:a16="http://schemas.microsoft.com/office/drawing/2014/main" id="{8506C970-8651-F244-A2E1-1AEB2E5CE564}"/>
+                <a16:creationId xmlns:a16="http://schemas.microsoft.com/office/drawing/2014/main" id="{70279043-36A3-F443-83B1-3BD5A20E8030}"/>
               </a:ext>
             </a:extLst>
           </p:cNvPr>
@@ -3758,40 +4722,60 @@
         <p:txBody>
           <a:bodyPr/>
           <a:lstStyle/>
+          <a:p>
+            <a:pPr marL="0" indent="0">
+              <a:lnSpc>
+                <a:spcPct val="100000"/>
+              </a:lnSpc>
+              <a:buNone/>
+            </a:pPr>
+            <a:r>
+              <a:rPr lang="en-GB" dirty="0"/>
+              <a:t>Empirically find correlations between the characteristics of Neural Networks in the settings of sugar beet recognition to be:</a:t>
+            </a:r>
+          </a:p>
           <a:p>
             <a:pPr>
               <a:lnSpc>
-                <a:spcPct val="200000"/>
+                <a:spcPct val="150000"/>
               </a:lnSpc>
             </a:pPr>
             <a:r>
-              <a:rPr lang="en-GB" dirty="0"/>
-              <a:t>Discover the characteristics we are interested in</a:t>
-            </a:r>
+              <a:rPr lang="en-US" dirty="0"/>
+              <a:t>Precise</a:t>
+            </a:r>
+            <a:endParaRPr lang="it-IT" dirty="0"/>
           </a:p>
           <a:p>
             <a:pPr>
               <a:lnSpc>
-                <a:spcPct val="200000"/>
+                <a:spcPct val="150000"/>
               </a:lnSpc>
             </a:pPr>
             <a:r>
-              <a:rPr lang="en-GB" dirty="0"/>
-              <a:t>Develop a toolbox</a:t>
-            </a:r>
+              <a:rPr lang="it-IT" dirty="0" err="1"/>
+              <a:t>S</a:t>
+            </a:r>
+            <a:r>
+              <a:rPr lang="en-US" dirty="0" err="1"/>
+              <a:t>calable</a:t>
+            </a:r>
+            <a:endParaRPr lang="en-US" dirty="0"/>
           </a:p>
           <a:p>
             <a:pPr>
               <a:lnSpc>
-                <a:spcPct val="200000"/>
+                <a:spcPct val="150000"/>
               </a:lnSpc>
             </a:pPr>
             <a:r>
-              <a:rPr lang="en-GB" dirty="0"/>
-              <a:t>Analyse the networks</a:t>
-            </a:r>
-          </a:p>
-          <a:p>
+              <a:rPr lang="en-US" dirty="0"/>
+              <a:t>Predictable</a:t>
+            </a:r>
+            <a:r>
+              <a:rPr lang="it-IT" dirty="0"/>
+              <a:t> in time</a:t>
+            </a:r>
             <a:endParaRPr lang="en-GB" dirty="0"/>
           </a:p>
         </p:txBody>
@@ -3801,7 +4785,7 @@
           <p:cNvPr id="4" name="Segnaposto numero diapositiva 3">
             <a:extLst>
               <a:ext uri="{FF2B5EF4-FFF2-40B4-BE49-F238E27FC236}">
-                <a16:creationId xmlns:a16="http://schemas.microsoft.com/office/drawing/2014/main" id="{39696E37-2280-364F-A6EB-1F89F9244272}"/>
+                <a16:creationId xmlns:a16="http://schemas.microsoft.com/office/drawing/2014/main" id="{4D77709B-B3DB-A446-A083-2B8408FF5E93}"/>
               </a:ext>
             </a:extLst>
           </p:cNvPr>
@@ -3831,7 +4815,7 @@
           <p:cNvPr id="5" name="Segnaposto data 4">
             <a:extLst>
               <a:ext uri="{FF2B5EF4-FFF2-40B4-BE49-F238E27FC236}">
-                <a16:creationId xmlns:a16="http://schemas.microsoft.com/office/drawing/2014/main" id="{6F152A9A-2064-0F44-A57F-B3146D9F7F32}"/>
+                <a16:creationId xmlns:a16="http://schemas.microsoft.com/office/drawing/2014/main" id="{F9D88DDA-7F72-D641-AE6E-E88E0821C825}"/>
               </a:ext>
             </a:extLst>
           </p:cNvPr>
@@ -3858,7 +4842,7 @@
     </p:spTree>
     <p:extLst>
       <p:ext uri="{BB962C8B-B14F-4D97-AF65-F5344CB8AC3E}">
-        <p14:creationId xmlns:p14="http://schemas.microsoft.com/office/powerpoint/2010/main" val="3252714856"/>
+        <p14:creationId xmlns:p14="http://schemas.microsoft.com/office/powerpoint/2010/main" val="17402907"/>
       </p:ext>
     </p:extLst>
   </p:cSld>
@@ -3908,7 +4892,7 @@
           <a:p>
             <a:r>
               <a:rPr lang="en-GB" dirty="0"/>
-              <a:t>The characteristics:</a:t>
+              <a:t>Why are we here?</a:t>
             </a:r>
           </a:p>
         </p:txBody>
@@ -3929,36 +4913,44 @@
             <p:ph idx="1"/>
           </p:nvPr>
         </p:nvSpPr>
-        <p:spPr/>
-        <p:txBody>
-          <a:bodyPr/>
-          <a:lstStyle/>
-          <a:p>
-            <a:pPr>
+        <p:spPr>
+          <a:xfrm>
+            <a:off x="838200" y="1690688"/>
+            <a:ext cx="10515600" cy="4351338"/>
+          </a:xfrm>
+        </p:spPr>
+        <p:txBody>
+          <a:bodyPr>
+            <a:normAutofit/>
+          </a:bodyPr>
+          <a:lstStyle/>
+          <a:p>
+            <a:pPr marL="0" indent="0">
               <a:lnSpc>
                 <a:spcPct val="200000"/>
               </a:lnSpc>
+              <a:buNone/>
             </a:pPr>
             <a:r>
               <a:rPr lang="en-GB" dirty="0"/>
-              <a:t>Training time</a:t>
-            </a:r>
-          </a:p>
-          <a:p>
-            <a:pPr>
+              <a:t>The characteristics for recognition are the following:</a:t>
+            </a:r>
+          </a:p>
+          <a:p>
+            <a:pPr lvl="1">
               <a:lnSpc>
-                <a:spcPct val="200000"/>
+                <a:spcPct val="110000"/>
               </a:lnSpc>
             </a:pPr>
             <a:r>
               <a:rPr lang="en-GB" dirty="0"/>
-              <a:t>Inference time</a:t>
-            </a:r>
-          </a:p>
-          <a:p>
-            <a:pPr>
+              <a:t>How correct is the prediction?</a:t>
+            </a:r>
+          </a:p>
+          <a:p>
+            <a:pPr lvl="2">
               <a:lnSpc>
-                <a:spcPct val="200000"/>
+                <a:spcPct val="110000"/>
               </a:lnSpc>
             </a:pPr>
             <a:r>
@@ -3967,14 +4959,47 @@
             </a:r>
           </a:p>
           <a:p>
-            <a:pPr>
+            <a:pPr lvl="1">
               <a:lnSpc>
-                <a:spcPct val="200000"/>
+                <a:spcPct val="110000"/>
               </a:lnSpc>
             </a:pPr>
             <a:r>
               <a:rPr lang="en-GB" dirty="0"/>
-              <a:t>Loss</a:t>
+              <a:t>How much training does the model require for predicting correctly?</a:t>
+            </a:r>
+          </a:p>
+          <a:p>
+            <a:pPr lvl="2">
+              <a:lnSpc>
+                <a:spcPct val="110000"/>
+              </a:lnSpc>
+            </a:pPr>
+            <a:r>
+              <a:rPr lang="en-GB" dirty="0"/>
+              <a:t>Training time</a:t>
+            </a:r>
+          </a:p>
+          <a:p>
+            <a:pPr lvl="1">
+              <a:lnSpc>
+                <a:spcPct val="100000"/>
+              </a:lnSpc>
+            </a:pPr>
+            <a:r>
+              <a:rPr lang="en-GB" dirty="0"/>
+              <a:t>How long does the model need for the prediction?</a:t>
+            </a:r>
+          </a:p>
+          <a:p>
+            <a:pPr lvl="2">
+              <a:lnSpc>
+                <a:spcPct val="100000"/>
+              </a:lnSpc>
+            </a:pPr>
+            <a:r>
+              <a:rPr lang="en-GB" dirty="0"/>
+              <a:t>Inference time</a:t>
             </a:r>
           </a:p>
         </p:txBody>
@@ -4073,7 +5098,7 @@
           <p:cNvPr id="2" name="Titolo 1">
             <a:extLst>
               <a:ext uri="{FF2B5EF4-FFF2-40B4-BE49-F238E27FC236}">
-                <a16:creationId xmlns:a16="http://schemas.microsoft.com/office/drawing/2014/main" id="{33F75CFA-0978-2C49-B129-0D64A7E11944}"/>
+                <a16:creationId xmlns:a16="http://schemas.microsoft.com/office/drawing/2014/main" id="{BEC18FD2-C8E4-FB4A-8295-8CF22B876009}"/>
               </a:ext>
             </a:extLst>
           </p:cNvPr>
@@ -4091,7 +5116,7 @@
           <a:p>
             <a:r>
               <a:rPr lang="en-GB" dirty="0"/>
-              <a:t>Our Tool:</a:t>
+              <a:t>Related work</a:t>
             </a:r>
           </a:p>
         </p:txBody>
@@ -4101,7 +5126,7 @@
           <p:cNvPr id="3" name="Segnaposto contenuto 2">
             <a:extLst>
               <a:ext uri="{FF2B5EF4-FFF2-40B4-BE49-F238E27FC236}">
-                <a16:creationId xmlns:a16="http://schemas.microsoft.com/office/drawing/2014/main" id="{7F4A696D-413F-454A-85D5-7B3CF3600539}"/>
+                <a16:creationId xmlns:a16="http://schemas.microsoft.com/office/drawing/2014/main" id="{4EB90A4C-B858-BA4A-8F24-2BC64F69E143}"/>
               </a:ext>
             </a:extLst>
           </p:cNvPr>
@@ -4119,45 +5144,67 @@
           <a:p>
             <a:pPr>
               <a:lnSpc>
-                <a:spcPct val="200000"/>
+                <a:spcPct val="150000"/>
               </a:lnSpc>
             </a:pPr>
             <a:r>
-              <a:rPr lang="en-GB" dirty="0"/>
-              <a:t>Relevant</a:t>
+              <a:rPr lang="en-US" dirty="0"/>
+              <a:t>In various researches, NN architectures are compared based on:</a:t>
+            </a:r>
+          </a:p>
+          <a:p>
+            <a:pPr lvl="1">
+              <a:lnSpc>
+                <a:spcPct val="100000"/>
+              </a:lnSpc>
+            </a:pPr>
+            <a:r>
+              <a:rPr lang="en-US" dirty="0"/>
+              <a:t>Accuracy achieved</a:t>
+            </a:r>
+          </a:p>
+          <a:p>
+            <a:pPr lvl="1">
+              <a:lnSpc>
+                <a:spcPct val="100000"/>
+              </a:lnSpc>
+            </a:pPr>
+            <a:r>
+              <a:rPr lang="en-US" dirty="0"/>
+              <a:t>Training time</a:t>
+            </a:r>
+          </a:p>
+          <a:p>
+            <a:pPr lvl="1">
+              <a:lnSpc>
+                <a:spcPct val="100000"/>
+              </a:lnSpc>
+            </a:pPr>
+            <a:r>
+              <a:rPr lang="en-US" dirty="0"/>
+              <a:t>Inference time</a:t>
             </a:r>
           </a:p>
           <a:p>
             <a:pPr>
               <a:lnSpc>
-                <a:spcPct val="200000"/>
+                <a:spcPct val="150000"/>
               </a:lnSpc>
             </a:pPr>
             <a:r>
               <a:rPr lang="en-GB" dirty="0"/>
-              <a:t>Reproducible</a:t>
+              <a:t>Various studies focus on the evaluation of NNs performances</a:t>
             </a:r>
           </a:p>
           <a:p>
             <a:pPr>
               <a:lnSpc>
-                <a:spcPct val="200000"/>
+                <a:spcPct val="150000"/>
               </a:lnSpc>
             </a:pPr>
             <a:r>
               <a:rPr lang="en-GB" dirty="0"/>
-              <a:t>Fair</a:t>
-            </a:r>
-          </a:p>
-          <a:p>
-            <a:pPr>
-              <a:lnSpc>
-                <a:spcPct val="200000"/>
-              </a:lnSpc>
-            </a:pPr>
-            <a:r>
-              <a:rPr lang="en-GB" dirty="0"/>
-              <a:t>Verifiable</a:t>
+              <a:t>Not suitable for our goal</a:t>
             </a:r>
           </a:p>
         </p:txBody>
@@ -4167,7 +5214,7 @@
           <p:cNvPr id="4" name="Segnaposto numero diapositiva 3">
             <a:extLst>
               <a:ext uri="{FF2B5EF4-FFF2-40B4-BE49-F238E27FC236}">
-                <a16:creationId xmlns:a16="http://schemas.microsoft.com/office/drawing/2014/main" id="{8BC27D13-0283-4742-A930-8CA100DD9A15}"/>
+                <a16:creationId xmlns:a16="http://schemas.microsoft.com/office/drawing/2014/main" id="{9E48A6DB-333B-0941-ABE9-70EA7A76E94E}"/>
               </a:ext>
             </a:extLst>
           </p:cNvPr>
@@ -4197,7 +5244,7 @@
           <p:cNvPr id="5" name="Segnaposto data 4">
             <a:extLst>
               <a:ext uri="{FF2B5EF4-FFF2-40B4-BE49-F238E27FC236}">
-                <a16:creationId xmlns:a16="http://schemas.microsoft.com/office/drawing/2014/main" id="{1C04ACD9-E715-0240-9450-6979FD65D55B}"/>
+                <a16:creationId xmlns:a16="http://schemas.microsoft.com/office/drawing/2014/main" id="{11CF8B93-6197-CF49-B406-671B04B61091}"/>
               </a:ext>
             </a:extLst>
           </p:cNvPr>
@@ -4224,7 +5271,7 @@
     </p:spTree>
     <p:extLst>
       <p:ext uri="{BB962C8B-B14F-4D97-AF65-F5344CB8AC3E}">
-        <p14:creationId xmlns:p14="http://schemas.microsoft.com/office/powerpoint/2010/main" val="2444328643"/>
+        <p14:creationId xmlns:p14="http://schemas.microsoft.com/office/powerpoint/2010/main" val="117783452"/>
       </p:ext>
     </p:extLst>
   </p:cSld>
@@ -4251,41 +5298,122 @@
           <a:chExt cx="0" cy="0"/>
         </a:xfrm>
       </p:grpSpPr>
-      <p:pic>
-        <p:nvPicPr>
-          <p:cNvPr id="7" name="Segnaposto contenuto 6">
-            <a:extLst>
-              <a:ext uri="{FF2B5EF4-FFF2-40B4-BE49-F238E27FC236}">
-                <a16:creationId xmlns:a16="http://schemas.microsoft.com/office/drawing/2014/main" id="{5FDB5179-E536-F847-93CF-090CA523CC13}"/>
-              </a:ext>
-            </a:extLst>
-          </p:cNvPr>
-          <p:cNvPicPr>
-            <a:picLocks noGrp="1" noChangeAspect="1"/>
-          </p:cNvPicPr>
+      <p:sp>
+        <p:nvSpPr>
+          <p:cNvPr id="2" name="Titolo 1">
+            <a:extLst>
+              <a:ext uri="{FF2B5EF4-FFF2-40B4-BE49-F238E27FC236}">
+                <a16:creationId xmlns:a16="http://schemas.microsoft.com/office/drawing/2014/main" id="{B448921D-AA49-6548-8A89-7D9829973FE0}"/>
+              </a:ext>
+            </a:extLst>
+          </p:cNvPr>
+          <p:cNvSpPr>
+            <a:spLocks noGrp="1"/>
+          </p:cNvSpPr>
+          <p:nvPr>
+            <p:ph type="title"/>
+          </p:nvPr>
+        </p:nvSpPr>
+        <p:spPr/>
+        <p:txBody>
+          <a:bodyPr/>
+          <a:lstStyle/>
+          <a:p>
+            <a:r>
+              <a:rPr lang="en-GB" dirty="0"/>
+              <a:t>The problem</a:t>
+            </a:r>
+          </a:p>
+        </p:txBody>
+      </p:sp>
+      <p:sp>
+        <p:nvSpPr>
+          <p:cNvPr id="3" name="Segnaposto contenuto 2">
+            <a:extLst>
+              <a:ext uri="{FF2B5EF4-FFF2-40B4-BE49-F238E27FC236}">
+                <a16:creationId xmlns:a16="http://schemas.microsoft.com/office/drawing/2014/main" id="{E8B36CA0-F72D-7243-8285-082E1C73D615}"/>
+              </a:ext>
+            </a:extLst>
+          </p:cNvPr>
+          <p:cNvSpPr>
+            <a:spLocks noGrp="1"/>
+          </p:cNvSpPr>
           <p:nvPr>
             <p:ph idx="1"/>
           </p:nvPr>
-        </p:nvPicPr>
-        <p:blipFill>
-          <a:blip r:embed="rId2"/>
-          <a:stretch>
-            <a:fillRect/>
-          </a:stretch>
-        </p:blipFill>
-        <p:spPr>
-          <a:xfrm>
-            <a:off x="742338" y="455360"/>
-            <a:ext cx="4961915" cy="4952031"/>
-          </a:xfrm>
-        </p:spPr>
-      </p:pic>
+        </p:nvSpPr>
+        <p:spPr/>
+        <p:txBody>
+          <a:bodyPr/>
+          <a:lstStyle/>
+          <a:p>
+            <a:pPr>
+              <a:lnSpc>
+                <a:spcPct val="150000"/>
+              </a:lnSpc>
+            </a:pPr>
+            <a:r>
+              <a:rPr lang="en-GB" dirty="0"/>
+              <a:t>How is the weed managed in sugar beet plantations?</a:t>
+            </a:r>
+          </a:p>
+          <a:p>
+            <a:pPr>
+              <a:lnSpc>
+                <a:spcPct val="150000"/>
+              </a:lnSpc>
+            </a:pPr>
+            <a:r>
+              <a:rPr lang="en-GB" dirty="0"/>
+              <a:t>5 main weed management techniques:</a:t>
+            </a:r>
+          </a:p>
+          <a:p>
+            <a:pPr lvl="1"/>
+            <a:r>
+              <a:rPr lang="en-GB" dirty="0"/>
+              <a:t>Tillage</a:t>
+            </a:r>
+          </a:p>
+          <a:p>
+            <a:pPr lvl="1"/>
+            <a:r>
+              <a:rPr lang="en-GB" dirty="0"/>
+              <a:t>Crop rotation</a:t>
+            </a:r>
+          </a:p>
+          <a:p>
+            <a:pPr lvl="1"/>
+            <a:r>
+              <a:rPr lang="en-GB" dirty="0"/>
+              <a:t>Mechanical control</a:t>
+            </a:r>
+          </a:p>
+          <a:p>
+            <a:pPr lvl="1"/>
+            <a:r>
+              <a:rPr lang="en-GB" dirty="0"/>
+              <a:t>Herbicides</a:t>
+            </a:r>
+          </a:p>
+          <a:p>
+            <a:pPr lvl="1"/>
+            <a:r>
+              <a:rPr lang="en-GB" dirty="0"/>
+              <a:t>Novel automatic techniques</a:t>
+            </a:r>
+          </a:p>
+          <a:p>
+            <a:endParaRPr lang="en-GB" dirty="0"/>
+          </a:p>
+        </p:txBody>
+      </p:sp>
       <p:sp>
         <p:nvSpPr>
           <p:cNvPr id="4" name="Segnaposto numero diapositiva 3">
             <a:extLst>
               <a:ext uri="{FF2B5EF4-FFF2-40B4-BE49-F238E27FC236}">
-                <a16:creationId xmlns:a16="http://schemas.microsoft.com/office/drawing/2014/main" id="{A6005941-10F2-6A49-A7B7-6F2E04997EF7}"/>
+                <a16:creationId xmlns:a16="http://schemas.microsoft.com/office/drawing/2014/main" id="{17DEF930-7056-7945-BB5F-7ED7D80EDE33}"/>
               </a:ext>
             </a:extLst>
           </p:cNvPr>
@@ -4315,7 +5443,7 @@
           <p:cNvPr id="5" name="Segnaposto data 4">
             <a:extLst>
               <a:ext uri="{FF2B5EF4-FFF2-40B4-BE49-F238E27FC236}">
-                <a16:creationId xmlns:a16="http://schemas.microsoft.com/office/drawing/2014/main" id="{9926EBA1-1949-A14D-B8FC-B8FEF1B4E8AC}"/>
+                <a16:creationId xmlns:a16="http://schemas.microsoft.com/office/drawing/2014/main" id="{03B7A72B-75D8-7B46-BCE5-238F6228E157}"/>
               </a:ext>
             </a:extLst>
           </p:cNvPr>
@@ -4336,130 +5464,13 @@
               <a:t>Luca Brodo - HSHL</a:t>
             </a:r>
             <a:endParaRPr lang="en-US" dirty="0"/>
-          </a:p>
-        </p:txBody>
-      </p:sp>
-      <p:pic>
-        <p:nvPicPr>
-          <p:cNvPr id="8" name="Segnaposto contenuto 6">
-            <a:extLst>
-              <a:ext uri="{FF2B5EF4-FFF2-40B4-BE49-F238E27FC236}">
-                <a16:creationId xmlns:a16="http://schemas.microsoft.com/office/drawing/2014/main" id="{9DC572C0-11C4-2348-8B93-DCA1098C3BFF}"/>
-              </a:ext>
-            </a:extLst>
-          </p:cNvPr>
-          <p:cNvPicPr>
-            <a:picLocks noChangeAspect="1"/>
-          </p:cNvPicPr>
-          <p:nvPr/>
-        </p:nvPicPr>
-        <p:blipFill>
-          <a:blip r:embed="rId3"/>
-          <a:stretch>
-            <a:fillRect/>
-          </a:stretch>
-        </p:blipFill>
-        <p:spPr>
-          <a:xfrm>
-            <a:off x="6410504" y="365125"/>
-            <a:ext cx="4835994" cy="5568138"/>
-          </a:xfrm>
-          <a:prstGeom prst="rect">
-            <a:avLst/>
-          </a:prstGeom>
-        </p:spPr>
-      </p:pic>
-      <p:cxnSp>
-        <p:nvCxnSpPr>
-          <p:cNvPr id="10" name="Connettore 2 9">
-            <a:extLst>
-              <a:ext uri="{FF2B5EF4-FFF2-40B4-BE49-F238E27FC236}">
-                <a16:creationId xmlns:a16="http://schemas.microsoft.com/office/drawing/2014/main" id="{85FA38E7-B423-E742-BE2C-FA47D9196CDD}"/>
-              </a:ext>
-            </a:extLst>
-          </p:cNvPr>
-          <p:cNvCxnSpPr>
-            <a:cxnSpLocks/>
-            <a:stCxn id="13" idx="6"/>
-          </p:cNvCxnSpPr>
-          <p:nvPr/>
-        </p:nvCxnSpPr>
-        <p:spPr>
-          <a:xfrm flipV="1">
-            <a:off x="4795024" y="3534937"/>
-            <a:ext cx="1906859" cy="69697"/>
-          </a:xfrm>
-          <a:prstGeom prst="straightConnector1">
-            <a:avLst/>
-          </a:prstGeom>
-          <a:ln>
-            <a:tailEnd type="triangle"/>
-          </a:ln>
-        </p:spPr>
-        <p:style>
-          <a:lnRef idx="1">
-            <a:schemeClr val="accent1"/>
-          </a:lnRef>
-          <a:fillRef idx="0">
-            <a:schemeClr val="accent1"/>
-          </a:fillRef>
-          <a:effectRef idx="0">
-            <a:schemeClr val="accent1"/>
-          </a:effectRef>
-          <a:fontRef idx="minor">
-            <a:schemeClr val="tx1"/>
-          </a:fontRef>
-        </p:style>
-      </p:cxnSp>
-      <p:sp>
-        <p:nvSpPr>
-          <p:cNvPr id="13" name="Ovale 12">
-            <a:extLst>
-              <a:ext uri="{FF2B5EF4-FFF2-40B4-BE49-F238E27FC236}">
-                <a16:creationId xmlns:a16="http://schemas.microsoft.com/office/drawing/2014/main" id="{B08404B8-5149-C84A-A44D-0AC881695200}"/>
-              </a:ext>
-            </a:extLst>
-          </p:cNvPr>
-          <p:cNvSpPr/>
-          <p:nvPr/>
-        </p:nvSpPr>
-        <p:spPr>
-          <a:xfrm>
-            <a:off x="1427356" y="3205979"/>
-            <a:ext cx="3367668" cy="797309"/>
-          </a:xfrm>
-          <a:prstGeom prst="ellipse">
-            <a:avLst/>
-          </a:prstGeom>
-          <a:noFill/>
-        </p:spPr>
-        <p:style>
-          <a:lnRef idx="2">
-            <a:schemeClr val="accent5"/>
-          </a:lnRef>
-          <a:fillRef idx="1">
-            <a:schemeClr val="lt1"/>
-          </a:fillRef>
-          <a:effectRef idx="0">
-            <a:schemeClr val="accent5"/>
-          </a:effectRef>
-          <a:fontRef idx="minor">
-            <a:schemeClr val="dk1"/>
-          </a:fontRef>
-        </p:style>
-        <p:txBody>
-          <a:bodyPr rtlCol="0" anchor="ctr"/>
-          <a:lstStyle/>
-          <a:p>
-            <a:pPr algn="ctr"/>
-            <a:endParaRPr lang="en-GB"/>
           </a:p>
         </p:txBody>
       </p:sp>
     </p:spTree>
     <p:extLst>
       <p:ext uri="{BB962C8B-B14F-4D97-AF65-F5344CB8AC3E}">
-        <p14:creationId xmlns:p14="http://schemas.microsoft.com/office/powerpoint/2010/main" val="1660645076"/>
+        <p14:creationId xmlns:p14="http://schemas.microsoft.com/office/powerpoint/2010/main" val="1672933282"/>
       </p:ext>
     </p:extLst>
   </p:cSld>
@@ -4491,7 +5502,7 @@
           <p:cNvPr id="2" name="Titolo 1">
             <a:extLst>
               <a:ext uri="{FF2B5EF4-FFF2-40B4-BE49-F238E27FC236}">
-                <a16:creationId xmlns:a16="http://schemas.microsoft.com/office/drawing/2014/main" id="{6BCA9ABE-99EE-7D40-97B3-6E2A73D1ADAA}"/>
+                <a16:creationId xmlns:a16="http://schemas.microsoft.com/office/drawing/2014/main" id="{36A4511E-B8C2-F54E-89D5-E7F09D85E9C7}"/>
               </a:ext>
             </a:extLst>
           </p:cNvPr>
@@ -4509,7 +5520,7 @@
           <a:p>
             <a:r>
               <a:rPr lang="en-GB" dirty="0"/>
-              <a:t>What else can we do?</a:t>
+              <a:t>The problem</a:t>
             </a:r>
           </a:p>
         </p:txBody>
@@ -4519,7 +5530,7 @@
           <p:cNvPr id="3" name="Segnaposto contenuto 2">
             <a:extLst>
               <a:ext uri="{FF2B5EF4-FFF2-40B4-BE49-F238E27FC236}">
-                <a16:creationId xmlns:a16="http://schemas.microsoft.com/office/drawing/2014/main" id="{40129135-5223-1F49-9548-D48EBCFC00D6}"/>
+                <a16:creationId xmlns:a16="http://schemas.microsoft.com/office/drawing/2014/main" id="{C663BD7C-0EE2-E243-93EA-494BB0407670}"/>
               </a:ext>
             </a:extLst>
           </p:cNvPr>
@@ -4537,34 +5548,34 @@
           <a:p>
             <a:pPr>
               <a:lnSpc>
-                <a:spcPct val="200000"/>
+                <a:spcPct val="150000"/>
               </a:lnSpc>
             </a:pPr>
             <a:r>
               <a:rPr lang="en-GB" dirty="0"/>
-              <a:t>Analyse both training and inference time with grey-scale version</a:t>
+              <a:t>Automatic weed management require the recognition of sugar beets and the weeds.</a:t>
             </a:r>
           </a:p>
           <a:p>
             <a:pPr>
               <a:lnSpc>
-                <a:spcPct val="200000"/>
+                <a:spcPct val="150000"/>
               </a:lnSpc>
             </a:pPr>
             <a:r>
               <a:rPr lang="en-GB" dirty="0"/>
-              <a:t>Further analysis on the slowest images</a:t>
+              <a:t>The recognition is done through images</a:t>
             </a:r>
           </a:p>
           <a:p>
             <a:pPr>
               <a:lnSpc>
-                <a:spcPct val="200000"/>
+                <a:spcPct val="150000"/>
               </a:lnSpc>
             </a:pPr>
             <a:r>
               <a:rPr lang="en-GB" dirty="0"/>
-              <a:t>Analysis of the training and validation loss</a:t>
+              <a:t>A lot of uncertainty </a:t>
             </a:r>
           </a:p>
         </p:txBody>
@@ -4574,7 +5585,7 @@
           <p:cNvPr id="4" name="Segnaposto numero diapositiva 3">
             <a:extLst>
               <a:ext uri="{FF2B5EF4-FFF2-40B4-BE49-F238E27FC236}">
-                <a16:creationId xmlns:a16="http://schemas.microsoft.com/office/drawing/2014/main" id="{033EAE32-90A4-C841-BF6E-A3B229E51295}"/>
+                <a16:creationId xmlns:a16="http://schemas.microsoft.com/office/drawing/2014/main" id="{CAD6EE61-BF42-E948-92FC-F9980AECB0CE}"/>
               </a:ext>
             </a:extLst>
           </p:cNvPr>
@@ -4604,7 +5615,7 @@
           <p:cNvPr id="5" name="Segnaposto data 4">
             <a:extLst>
               <a:ext uri="{FF2B5EF4-FFF2-40B4-BE49-F238E27FC236}">
-                <a16:creationId xmlns:a16="http://schemas.microsoft.com/office/drawing/2014/main" id="{356BE2CA-C63A-C048-A841-DD176940BA43}"/>
+                <a16:creationId xmlns:a16="http://schemas.microsoft.com/office/drawing/2014/main" id="{773466A7-CC09-4A4C-9626-88DA7DAA9BEF}"/>
               </a:ext>
             </a:extLst>
           </p:cNvPr>
@@ -4631,7 +5642,7 @@
     </p:spTree>
     <p:extLst>
       <p:ext uri="{BB962C8B-B14F-4D97-AF65-F5344CB8AC3E}">
-        <p14:creationId xmlns:p14="http://schemas.microsoft.com/office/powerpoint/2010/main" val="3441769586"/>
+        <p14:creationId xmlns:p14="http://schemas.microsoft.com/office/powerpoint/2010/main" val="257324634"/>
       </p:ext>
     </p:extLst>
   </p:cSld>
@@ -4663,7 +5674,7 @@
           <p:cNvPr id="2" name="Titolo 1">
             <a:extLst>
               <a:ext uri="{FF2B5EF4-FFF2-40B4-BE49-F238E27FC236}">
-                <a16:creationId xmlns:a16="http://schemas.microsoft.com/office/drawing/2014/main" id="{6BCA9ABE-99EE-7D40-97B3-6E2A73D1ADAA}"/>
+                <a16:creationId xmlns:a16="http://schemas.microsoft.com/office/drawing/2014/main" id="{DFDF1C8D-DE0A-8C4D-8C7F-5C6009B810C2}"/>
               </a:ext>
             </a:extLst>
           </p:cNvPr>
@@ -4681,7 +5692,7 @@
           <a:p>
             <a:r>
               <a:rPr lang="en-GB" dirty="0"/>
-              <a:t>Use case</a:t>
+              <a:t>The problem</a:t>
             </a:r>
           </a:p>
         </p:txBody>
@@ -4691,7 +5702,7 @@
           <p:cNvPr id="3" name="Segnaposto contenuto 2">
             <a:extLst>
               <a:ext uri="{FF2B5EF4-FFF2-40B4-BE49-F238E27FC236}">
-                <a16:creationId xmlns:a16="http://schemas.microsoft.com/office/drawing/2014/main" id="{40129135-5223-1F49-9548-D48EBCFC00D6}"/>
+                <a16:creationId xmlns:a16="http://schemas.microsoft.com/office/drawing/2014/main" id="{32A5A34A-F9A2-234C-A99A-BC0C9441DF76}"/>
               </a:ext>
             </a:extLst>
           </p:cNvPr>
@@ -4709,34 +5720,56 @@
           <a:p>
             <a:pPr>
               <a:lnSpc>
-                <a:spcPct val="200000"/>
+                <a:spcPct val="150000"/>
               </a:lnSpc>
             </a:pPr>
             <a:r>
               <a:rPr lang="en-GB" dirty="0"/>
-              <a:t>“Plants_seedlings_v2” dataset</a:t>
+              <a:t>Various possible data acquisition techniques</a:t>
             </a:r>
           </a:p>
           <a:p>
             <a:pPr>
               <a:lnSpc>
-                <a:spcPct val="200000"/>
+                <a:spcPct val="150000"/>
               </a:lnSpc>
             </a:pPr>
             <a:r>
               <a:rPr lang="en-GB" dirty="0"/>
-              <a:t>~1000 images of seedlings of 12 species</a:t>
+              <a:t>Various possible datasets </a:t>
             </a:r>
           </a:p>
           <a:p>
             <a:pPr>
               <a:lnSpc>
-                <a:spcPct val="200000"/>
+                <a:spcPct val="150000"/>
               </a:lnSpc>
             </a:pPr>
             <a:r>
               <a:rPr lang="en-GB" dirty="0"/>
-              <a:t>10 pixels per mm</a:t>
+              <a:t>Two Detection approaches:</a:t>
+            </a:r>
+          </a:p>
+          <a:p>
+            <a:pPr lvl="1">
+              <a:lnSpc>
+                <a:spcPct val="150000"/>
+              </a:lnSpc>
+            </a:pPr>
+            <a:r>
+              <a:rPr lang="en-GB" dirty="0"/>
+              <a:t>Plant-based classification</a:t>
+            </a:r>
+          </a:p>
+          <a:p>
+            <a:pPr lvl="1">
+              <a:lnSpc>
+                <a:spcPct val="150000"/>
+              </a:lnSpc>
+            </a:pPr>
+            <a:r>
+              <a:rPr lang="en-GB" dirty="0"/>
+              <a:t>Weed mapping</a:t>
             </a:r>
           </a:p>
         </p:txBody>
@@ -4746,7 +5779,7 @@
           <p:cNvPr id="4" name="Segnaposto numero diapositiva 3">
             <a:extLst>
               <a:ext uri="{FF2B5EF4-FFF2-40B4-BE49-F238E27FC236}">
-                <a16:creationId xmlns:a16="http://schemas.microsoft.com/office/drawing/2014/main" id="{033EAE32-90A4-C841-BF6E-A3B229E51295}"/>
+                <a16:creationId xmlns:a16="http://schemas.microsoft.com/office/drawing/2014/main" id="{695D859B-E530-874F-99DE-353607C7D10A}"/>
               </a:ext>
             </a:extLst>
           </p:cNvPr>
@@ -4776,7 +5809,7 @@
           <p:cNvPr id="5" name="Segnaposto data 4">
             <a:extLst>
               <a:ext uri="{FF2B5EF4-FFF2-40B4-BE49-F238E27FC236}">
-                <a16:creationId xmlns:a16="http://schemas.microsoft.com/office/drawing/2014/main" id="{356BE2CA-C63A-C048-A841-DD176940BA43}"/>
+                <a16:creationId xmlns:a16="http://schemas.microsoft.com/office/drawing/2014/main" id="{C9D88894-2147-0F43-89C4-6DA01082A496}"/>
               </a:ext>
             </a:extLst>
           </p:cNvPr>
@@ -4800,40 +5833,10 @@
           </a:p>
         </p:txBody>
       </p:sp>
-      <p:pic>
-        <p:nvPicPr>
-          <p:cNvPr id="7" name="Immagine 6">
-            <a:extLst>
-              <a:ext uri="{FF2B5EF4-FFF2-40B4-BE49-F238E27FC236}">
-                <a16:creationId xmlns:a16="http://schemas.microsoft.com/office/drawing/2014/main" id="{F9B47BEC-20AC-834D-A831-9F89CFCEBB9B}"/>
-              </a:ext>
-            </a:extLst>
-          </p:cNvPr>
-          <p:cNvPicPr>
-            <a:picLocks noChangeAspect="1"/>
-          </p:cNvPicPr>
-          <p:nvPr/>
-        </p:nvPicPr>
-        <p:blipFill>
-          <a:blip r:embed="rId2"/>
-          <a:stretch>
-            <a:fillRect/>
-          </a:stretch>
-        </p:blipFill>
-        <p:spPr>
-          <a:xfrm>
-            <a:off x="8112667" y="1035050"/>
-            <a:ext cx="2679700" cy="4787900"/>
-          </a:xfrm>
-          <a:prstGeom prst="rect">
-            <a:avLst/>
-          </a:prstGeom>
-        </p:spPr>
-      </p:pic>
     </p:spTree>
     <p:extLst>
       <p:ext uri="{BB962C8B-B14F-4D97-AF65-F5344CB8AC3E}">
-        <p14:creationId xmlns:p14="http://schemas.microsoft.com/office/powerpoint/2010/main" val="1963818321"/>
+        <p14:creationId xmlns:p14="http://schemas.microsoft.com/office/powerpoint/2010/main" val="548912486"/>
       </p:ext>
     </p:extLst>
   </p:cSld>
@@ -4862,10 +5865,121 @@
       </p:grpSpPr>
       <p:sp>
         <p:nvSpPr>
+          <p:cNvPr id="2" name="Titolo 1">
+            <a:extLst>
+              <a:ext uri="{FF2B5EF4-FFF2-40B4-BE49-F238E27FC236}">
+                <a16:creationId xmlns:a16="http://schemas.microsoft.com/office/drawing/2014/main" id="{A62D6C95-A9A8-2E43-9DC6-D80515A71D7F}"/>
+              </a:ext>
+            </a:extLst>
+          </p:cNvPr>
+          <p:cNvSpPr>
+            <a:spLocks noGrp="1"/>
+          </p:cNvSpPr>
+          <p:nvPr>
+            <p:ph type="title"/>
+          </p:nvPr>
+        </p:nvSpPr>
+        <p:spPr/>
+        <p:txBody>
+          <a:bodyPr/>
+          <a:lstStyle/>
+          <a:p>
+            <a:r>
+              <a:rPr lang="en-GB" dirty="0"/>
+              <a:t>The problem</a:t>
+            </a:r>
+          </a:p>
+        </p:txBody>
+      </p:sp>
+      <p:sp>
+        <p:nvSpPr>
+          <p:cNvPr id="3" name="Segnaposto contenuto 2">
+            <a:extLst>
+              <a:ext uri="{FF2B5EF4-FFF2-40B4-BE49-F238E27FC236}">
+                <a16:creationId xmlns:a16="http://schemas.microsoft.com/office/drawing/2014/main" id="{03EBBE51-D1E1-EC41-B54C-D7C213D50D38}"/>
+              </a:ext>
+            </a:extLst>
+          </p:cNvPr>
+          <p:cNvSpPr>
+            <a:spLocks noGrp="1"/>
+          </p:cNvSpPr>
+          <p:nvPr>
+            <p:ph idx="1"/>
+          </p:nvPr>
+        </p:nvSpPr>
+        <p:spPr/>
+        <p:txBody>
+          <a:bodyPr/>
+          <a:lstStyle/>
+          <a:p>
+            <a:pPr>
+              <a:lnSpc>
+                <a:spcPct val="150000"/>
+              </a:lnSpc>
+            </a:pPr>
+            <a:r>
+              <a:rPr lang="en-GB" dirty="0"/>
+              <a:t>Various detection solutions:</a:t>
+            </a:r>
+          </a:p>
+          <a:p>
+            <a:pPr lvl="1">
+              <a:lnSpc>
+                <a:spcPct val="150000"/>
+              </a:lnSpc>
+            </a:pPr>
+            <a:r>
+              <a:rPr lang="en-GB" dirty="0"/>
+              <a:t>Convolutional neural networks</a:t>
+            </a:r>
+          </a:p>
+          <a:p>
+            <a:pPr lvl="1">
+              <a:lnSpc>
+                <a:spcPct val="150000"/>
+              </a:lnSpc>
+            </a:pPr>
+            <a:r>
+              <a:rPr lang="en-GB" dirty="0"/>
+              <a:t>CNNs as feature extractor for traditional classifiers</a:t>
+            </a:r>
+          </a:p>
+          <a:p>
+            <a:pPr lvl="1">
+              <a:lnSpc>
+                <a:spcPct val="150000"/>
+              </a:lnSpc>
+            </a:pPr>
+            <a:r>
+              <a:rPr lang="en-GB" dirty="0"/>
+              <a:t>Fully convolutional neural networks</a:t>
+            </a:r>
+          </a:p>
+          <a:p>
+            <a:pPr>
+              <a:lnSpc>
+                <a:spcPct val="150000"/>
+              </a:lnSpc>
+            </a:pPr>
+            <a:r>
+              <a:rPr lang="en-GB" dirty="0"/>
+              <a:t>Different performances of the models</a:t>
+            </a:r>
+          </a:p>
+          <a:p>
+            <a:pPr marL="457200" lvl="1" indent="0">
+              <a:buNone/>
+            </a:pPr>
+            <a:endParaRPr lang="en-GB" dirty="0"/>
+          </a:p>
+        </p:txBody>
+      </p:sp>
+      <p:sp>
+        <p:nvSpPr>
           <p:cNvPr id="4" name="Segnaposto numero diapositiva 3">
             <a:extLst>
               <a:ext uri="{FF2B5EF4-FFF2-40B4-BE49-F238E27FC236}">
-                <a16:creationId xmlns:a16="http://schemas.microsoft.com/office/drawing/2014/main" id="{9BE5D24F-6D41-A040-8563-C9375B8CC2A7}"/>
+                <a16:creationId xmlns:a16="http://schemas.microsoft.com/office/drawing/2014/main" id="{F930EE6B-8DDA-0348-AC40-87F1B74C79E2}"/>
               </a:ext>
             </a:extLst>
           </p:cNvPr>
@@ -4895,7 +6009,7 @@
           <p:cNvPr id="5" name="Segnaposto data 4">
             <a:extLst>
               <a:ext uri="{FF2B5EF4-FFF2-40B4-BE49-F238E27FC236}">
-                <a16:creationId xmlns:a16="http://schemas.microsoft.com/office/drawing/2014/main" id="{DC3B4ED9-3A7A-1E48-B3B0-CB8821AC6B47}"/>
+                <a16:creationId xmlns:a16="http://schemas.microsoft.com/office/drawing/2014/main" id="{68AF8FF4-9C0E-F346-B344-602541746332}"/>
               </a:ext>
             </a:extLst>
           </p:cNvPr>
@@ -4916,135 +6030,13 @@
               <a:t>Luca Brodo - HSHL</a:t>
             </a:r>
             <a:endParaRPr lang="en-US" dirty="0"/>
-          </a:p>
-        </p:txBody>
-      </p:sp>
-      <p:pic>
-        <p:nvPicPr>
-          <p:cNvPr id="7" name="Immagine 6">
-            <a:extLst>
-              <a:ext uri="{FF2B5EF4-FFF2-40B4-BE49-F238E27FC236}">
-                <a16:creationId xmlns:a16="http://schemas.microsoft.com/office/drawing/2014/main" id="{D8CC8427-9C89-2D49-9C14-E01C181C4731}"/>
-              </a:ext>
-            </a:extLst>
-          </p:cNvPr>
-          <p:cNvPicPr>
-            <a:picLocks noChangeAspect="1"/>
-          </p:cNvPicPr>
-          <p:nvPr/>
-        </p:nvPicPr>
-        <p:blipFill>
-          <a:blip r:embed="rId2"/>
-          <a:stretch>
-            <a:fillRect/>
-          </a:stretch>
-        </p:blipFill>
-        <p:spPr>
-          <a:xfrm>
-            <a:off x="1510030" y="945633"/>
-            <a:ext cx="9171940" cy="5283342"/>
-          </a:xfrm>
-          <a:prstGeom prst="rect">
-            <a:avLst/>
-          </a:prstGeom>
-        </p:spPr>
-      </p:pic>
-      <p:pic>
-        <p:nvPicPr>
-          <p:cNvPr id="9" name="Immagine 8">
-            <a:extLst>
-              <a:ext uri="{FF2B5EF4-FFF2-40B4-BE49-F238E27FC236}">
-                <a16:creationId xmlns:a16="http://schemas.microsoft.com/office/drawing/2014/main" id="{C6ADA199-E6D2-574A-AFB9-A36145FCB1A6}"/>
-              </a:ext>
-            </a:extLst>
-          </p:cNvPr>
-          <p:cNvPicPr>
-            <a:picLocks noChangeAspect="1"/>
-          </p:cNvPicPr>
-          <p:nvPr/>
-        </p:nvPicPr>
-        <p:blipFill rotWithShape="1">
-          <a:blip r:embed="rId3"/>
-          <a:srcRect b="3629"/>
-          <a:stretch/>
-        </p:blipFill>
-        <p:spPr>
-          <a:xfrm>
-            <a:off x="2849908" y="3195320"/>
-            <a:ext cx="6212509" cy="2352039"/>
-          </a:xfrm>
-          <a:prstGeom prst="rect">
-            <a:avLst/>
-          </a:prstGeom>
-          <a:solidFill>
-            <a:srgbClr val="FFFFFF">
-              <a:shade val="85000"/>
-            </a:srgbClr>
-          </a:solidFill>
-          <a:ln w="88900" cap="sq">
-            <a:solidFill>
-              <a:srgbClr val="FFFFFF"/>
-            </a:solidFill>
-            <a:miter lim="800000"/>
-          </a:ln>
-          <a:effectLst>
-            <a:outerShdw blurRad="55000" dist="18000" dir="5400000" algn="tl" rotWithShape="0">
-              <a:srgbClr val="000000">
-                <a:alpha val="40000"/>
-              </a:srgbClr>
-            </a:outerShdw>
-          </a:effectLst>
-          <a:scene3d>
-            <a:camera prst="orthographicFront"/>
-            <a:lightRig rig="twoPt" dir="t">
-              <a:rot lat="0" lon="0" rev="7200000"/>
-            </a:lightRig>
-          </a:scene3d>
-          <a:sp3d>
-            <a:bevelT w="25400" h="19050"/>
-            <a:contourClr>
-              <a:srgbClr val="FFFFFF"/>
-            </a:contourClr>
-          </a:sp3d>
-        </p:spPr>
-      </p:pic>
-      <p:sp>
-        <p:nvSpPr>
-          <p:cNvPr id="10" name="Titolo 1">
-            <a:extLst>
-              <a:ext uri="{FF2B5EF4-FFF2-40B4-BE49-F238E27FC236}">
-                <a16:creationId xmlns:a16="http://schemas.microsoft.com/office/drawing/2014/main" id="{4EA3A3AF-8892-1E4C-944E-F6FB8309E8A7}"/>
-              </a:ext>
-            </a:extLst>
-          </p:cNvPr>
-          <p:cNvSpPr>
-            <a:spLocks noGrp="1"/>
-          </p:cNvSpPr>
-          <p:nvPr>
-            <p:ph type="title"/>
-          </p:nvPr>
-        </p:nvSpPr>
-        <p:spPr>
-          <a:xfrm>
-            <a:off x="476451" y="0"/>
-            <a:ext cx="10515600" cy="1325563"/>
-          </a:xfrm>
-        </p:spPr>
-        <p:txBody>
-          <a:bodyPr/>
-          <a:lstStyle/>
-          <a:p>
-            <a:r>
-              <a:rPr lang="en-GB" dirty="0"/>
-              <a:t>Training time</a:t>
-            </a:r>
           </a:p>
         </p:txBody>
       </p:sp>
     </p:spTree>
     <p:extLst>
       <p:ext uri="{BB962C8B-B14F-4D97-AF65-F5344CB8AC3E}">
-        <p14:creationId xmlns:p14="http://schemas.microsoft.com/office/powerpoint/2010/main" val="3416853282"/>
+        <p14:creationId xmlns:p14="http://schemas.microsoft.com/office/powerpoint/2010/main" val="79083905"/>
       </p:ext>
     </p:extLst>
   </p:cSld>

</xml_diff>

<commit_message>
final version of thesis, presentation updated. Now the presentation will be studied and tried.
</commit_message>
<xml_diff>
--- a/Presentation/Final Presentation.pptx
+++ b/Presentation/Final Presentation.pptx
@@ -23,8 +23,8 @@
     <p:sldId id="265" r:id="rId14"/>
     <p:sldId id="267" r:id="rId15"/>
     <p:sldId id="268" r:id="rId16"/>
-    <p:sldId id="275" r:id="rId17"/>
-    <p:sldId id="274" r:id="rId18"/>
+    <p:sldId id="282" r:id="rId17"/>
+    <p:sldId id="275" r:id="rId18"/>
     <p:sldId id="258" r:id="rId19"/>
   </p:sldIdLst>
   <p:sldSz cx="12192000" cy="6858000"/>
@@ -217,7 +217,7 @@
           <a:p>
             <a:fld id="{4214EAB5-E09C-2143-976E-A916457BEE18}" type="datetimeFigureOut">
               <a:rPr lang="en-US" smtClean="0"/>
-              <a:t>2/14/22</a:t>
+              <a:t>2/16/22</a:t>
             </a:fld>
             <a:endParaRPr lang="en-US" dirty="0"/>
           </a:p>
@@ -2719,7 +2719,7 @@
           <a:p>
             <a:r>
               <a:rPr lang="en-GB" dirty="0"/>
-              <a:t>How do we analyse the models? </a:t>
+              <a:t>How can the models be analysed? </a:t>
             </a:r>
           </a:p>
         </p:txBody>
@@ -3125,8 +3125,8 @@
         </p:blipFill>
         <p:spPr>
           <a:xfrm>
-            <a:off x="1510030" y="945633"/>
-            <a:ext cx="9171940" cy="5283342"/>
+            <a:off x="1510029" y="1047585"/>
+            <a:ext cx="8638986" cy="4976343"/>
           </a:xfrm>
           <a:prstGeom prst="rect">
             <a:avLst/>
@@ -3154,8 +3154,8 @@
         </p:blipFill>
         <p:spPr>
           <a:xfrm>
-            <a:off x="2849908" y="3195320"/>
-            <a:ext cx="6212509" cy="2352039"/>
+            <a:off x="2543607" y="3308104"/>
+            <a:ext cx="6197855" cy="2346491"/>
           </a:xfrm>
           <a:prstGeom prst="rect">
             <a:avLst/>
@@ -3221,6 +3221,76 @@
             <a:r>
               <a:rPr lang="en-GB" dirty="0"/>
               <a:t>Training time</a:t>
+            </a:r>
+          </a:p>
+        </p:txBody>
+      </p:sp>
+      <p:sp>
+        <p:nvSpPr>
+          <p:cNvPr id="8" name="CasellaDiTesto 7">
+            <a:extLst>
+              <a:ext uri="{FF2B5EF4-FFF2-40B4-BE49-F238E27FC236}">
+                <a16:creationId xmlns:a16="http://schemas.microsoft.com/office/drawing/2014/main" id="{860EDCF0-54B0-394D-9E26-02F2B80380A2}"/>
+              </a:ext>
+            </a:extLst>
+          </p:cNvPr>
+          <p:cNvSpPr txBox="1"/>
+          <p:nvPr/>
+        </p:nvSpPr>
+        <p:spPr>
+          <a:xfrm rot="10800000" flipH="1" flipV="1">
+            <a:off x="5076512" y="5940923"/>
+            <a:ext cx="1635384" cy="369332"/>
+          </a:xfrm>
+          <a:prstGeom prst="rect">
+            <a:avLst/>
+          </a:prstGeom>
+          <a:noFill/>
+        </p:spPr>
+        <p:txBody>
+          <a:bodyPr wrap="none" rtlCol="0">
+            <a:spAutoFit/>
+          </a:bodyPr>
+          <a:lstStyle/>
+          <a:p>
+            <a:r>
+              <a:rPr lang="en-GB" dirty="0"/>
+              <a:t>Time passed (s)</a:t>
+            </a:r>
+          </a:p>
+        </p:txBody>
+      </p:sp>
+      <p:sp>
+        <p:nvSpPr>
+          <p:cNvPr id="11" name="CasellaDiTesto 10">
+            <a:extLst>
+              <a:ext uri="{FF2B5EF4-FFF2-40B4-BE49-F238E27FC236}">
+                <a16:creationId xmlns:a16="http://schemas.microsoft.com/office/drawing/2014/main" id="{F6FA3961-42BD-5849-9355-DC733CFBA1A9}"/>
+              </a:ext>
+            </a:extLst>
+          </p:cNvPr>
+          <p:cNvSpPr txBox="1"/>
+          <p:nvPr/>
+        </p:nvSpPr>
+        <p:spPr>
+          <a:xfrm rot="16200000">
+            <a:off x="813812" y="3244334"/>
+            <a:ext cx="1023101" cy="369332"/>
+          </a:xfrm>
+          <a:prstGeom prst="rect">
+            <a:avLst/>
+          </a:prstGeom>
+          <a:noFill/>
+        </p:spPr>
+        <p:txBody>
+          <a:bodyPr wrap="none" rtlCol="0">
+            <a:spAutoFit/>
+          </a:bodyPr>
+          <a:lstStyle/>
+          <a:p>
+            <a:r>
+              <a:rPr lang="en-GB" dirty="0"/>
+              <a:t>Accuracy</a:t>
             </a:r>
           </a:p>
         </p:txBody>
@@ -3724,7 +3794,7 @@
         </p:blipFill>
         <p:spPr>
           <a:xfrm>
-            <a:off x="2284686" y="1690688"/>
+            <a:off x="2284686" y="1589585"/>
             <a:ext cx="7695180" cy="4351338"/>
           </a:xfrm>
         </p:spPr>
@@ -3893,7 +3963,7 @@
           <p:cNvPr id="2" name="Titolo 1">
             <a:extLst>
               <a:ext uri="{FF2B5EF4-FFF2-40B4-BE49-F238E27FC236}">
-                <a16:creationId xmlns:a16="http://schemas.microsoft.com/office/drawing/2014/main" id="{56E5445D-D492-0D43-93CF-B9B22C9AFB77}"/>
+                <a16:creationId xmlns:a16="http://schemas.microsoft.com/office/drawing/2014/main" id="{69C90C2A-D216-6F47-B349-86681457889D}"/>
               </a:ext>
             </a:extLst>
           </p:cNvPr>
@@ -3904,24 +3974,14 @@
             <p:ph type="title"/>
           </p:nvPr>
         </p:nvSpPr>
-        <p:spPr>
-          <a:xfrm>
-            <a:off x="838200" y="182619"/>
-            <a:ext cx="10515600" cy="1325563"/>
-          </a:xfrm>
-        </p:spPr>
-        <p:txBody>
-          <a:bodyPr/>
-          <a:lstStyle/>
-          <a:p>
-            <a:pPr>
-              <a:lnSpc>
-                <a:spcPct val="150000"/>
-              </a:lnSpc>
-            </a:pPr>
-            <a:r>
-              <a:rPr lang="en-GB" dirty="0"/>
-              <a:t>What else can we do?</a:t>
+        <p:spPr/>
+        <p:txBody>
+          <a:bodyPr/>
+          <a:lstStyle/>
+          <a:p>
+            <a:r>
+              <a:rPr lang="en-GB" dirty="0"/>
+              <a:t>Overview</a:t>
             </a:r>
           </a:p>
         </p:txBody>
@@ -3931,7 +3991,7 @@
           <p:cNvPr id="3" name="Segnaposto contenuto 2">
             <a:extLst>
               <a:ext uri="{FF2B5EF4-FFF2-40B4-BE49-F238E27FC236}">
-                <a16:creationId xmlns:a16="http://schemas.microsoft.com/office/drawing/2014/main" id="{23208D79-EC64-0440-92D7-8B10863DCA54}"/>
+                <a16:creationId xmlns:a16="http://schemas.microsoft.com/office/drawing/2014/main" id="{1281C123-C42D-5B40-9786-D1EB8217DC38}"/>
               </a:ext>
             </a:extLst>
           </p:cNvPr>
@@ -3942,16 +4002,9 @@
             <p:ph idx="1"/>
           </p:nvPr>
         </p:nvSpPr>
-        <p:spPr>
-          <a:xfrm>
-            <a:off x="838200" y="1371600"/>
-            <a:ext cx="10515600" cy="4805363"/>
-          </a:xfrm>
-        </p:spPr>
-        <p:txBody>
-          <a:bodyPr>
-            <a:normAutofit fontScale="92500" lnSpcReduction="10000"/>
-          </a:bodyPr>
+        <p:spPr/>
+        <p:txBody>
+          <a:bodyPr/>
           <a:lstStyle/>
           <a:p>
             <a:pPr>
@@ -3961,7 +4014,7 @@
             </a:pPr>
             <a:r>
               <a:rPr lang="en-GB" dirty="0"/>
-              <a:t>Identify more correlations </a:t>
+              <a:t>In recognition tasks, model perform differently.</a:t>
             </a:r>
           </a:p>
           <a:p>
@@ -3972,7 +4025,7 @@
             </a:pPr>
             <a:r>
               <a:rPr lang="en-GB" dirty="0"/>
-              <a:t>How can we optimize applications with this method?</a:t>
+              <a:t>The goal: find correlations between different characteristics of NN</a:t>
             </a:r>
           </a:p>
           <a:p>
@@ -3983,51 +4036,7 @@
             </a:pPr>
             <a:r>
               <a:rPr lang="en-GB" dirty="0"/>
-              <a:t>Can we create contracts using these correlations?</a:t>
-            </a:r>
-          </a:p>
-          <a:p>
-            <a:pPr>
-              <a:lnSpc>
-                <a:spcPct val="170000"/>
-              </a:lnSpc>
-            </a:pPr>
-            <a:r>
-              <a:rPr lang="en-GB" dirty="0"/>
-              <a:t>Study input images </a:t>
-            </a:r>
-          </a:p>
-          <a:p>
-            <a:pPr lvl="1">
-              <a:lnSpc>
-                <a:spcPct val="110000"/>
-              </a:lnSpc>
-            </a:pPr>
-            <a:r>
-              <a:rPr lang="en-GB" dirty="0"/>
-              <a:t>Training images</a:t>
-            </a:r>
-          </a:p>
-          <a:p>
-            <a:pPr lvl="1">
-              <a:lnSpc>
-                <a:spcPct val="110000"/>
-              </a:lnSpc>
-            </a:pPr>
-            <a:r>
-              <a:rPr lang="en-GB" dirty="0"/>
-              <a:t>Finding characteristics of the images to use</a:t>
-            </a:r>
-          </a:p>
-          <a:p>
-            <a:pPr lvl="1">
-              <a:lnSpc>
-                <a:spcPct val="110000"/>
-              </a:lnSpc>
-            </a:pPr>
-            <a:r>
-              <a:rPr lang="en-GB" dirty="0"/>
-              <a:t>Develop a tool to automatically study these characteristics</a:t>
+              <a:t>How to find them? Precise Analysis</a:t>
             </a:r>
           </a:p>
           <a:p>
@@ -4040,7 +4049,7 @@
           <p:cNvPr id="4" name="Segnaposto numero diapositiva 3">
             <a:extLst>
               <a:ext uri="{FF2B5EF4-FFF2-40B4-BE49-F238E27FC236}">
-                <a16:creationId xmlns:a16="http://schemas.microsoft.com/office/drawing/2014/main" id="{58D8FCE9-C97A-1241-8125-E8CB47BB68B7}"/>
+                <a16:creationId xmlns:a16="http://schemas.microsoft.com/office/drawing/2014/main" id="{97A63FA1-EEDF-BB41-9144-840DF38A8265}"/>
               </a:ext>
             </a:extLst>
           </p:cNvPr>
@@ -4070,7 +4079,7 @@
           <p:cNvPr id="5" name="Segnaposto data 4">
             <a:extLst>
               <a:ext uri="{FF2B5EF4-FFF2-40B4-BE49-F238E27FC236}">
-                <a16:creationId xmlns:a16="http://schemas.microsoft.com/office/drawing/2014/main" id="{B7414060-65B0-FD46-9987-C7A4AFFA4E58}"/>
+                <a16:creationId xmlns:a16="http://schemas.microsoft.com/office/drawing/2014/main" id="{5956A236-E7BC-8344-BB53-C9E96EE4A08A}"/>
               </a:ext>
             </a:extLst>
           </p:cNvPr>
@@ -4097,7 +4106,7 @@
     </p:spTree>
     <p:extLst>
       <p:ext uri="{BB962C8B-B14F-4D97-AF65-F5344CB8AC3E}">
-        <p14:creationId xmlns:p14="http://schemas.microsoft.com/office/powerpoint/2010/main" val="223653232"/>
+        <p14:creationId xmlns:p14="http://schemas.microsoft.com/office/powerpoint/2010/main" val="1416318315"/>
       </p:ext>
     </p:extLst>
   </p:cSld>
@@ -4129,7 +4138,7 @@
           <p:cNvPr id="2" name="Titolo 1">
             <a:extLst>
               <a:ext uri="{FF2B5EF4-FFF2-40B4-BE49-F238E27FC236}">
-                <a16:creationId xmlns:a16="http://schemas.microsoft.com/office/drawing/2014/main" id="{01F90A6F-1DEC-004D-8DDC-D19ECD5CF89F}"/>
+                <a16:creationId xmlns:a16="http://schemas.microsoft.com/office/drawing/2014/main" id="{56E5445D-D492-0D43-93CF-B9B22C9AFB77}"/>
               </a:ext>
             </a:extLst>
           </p:cNvPr>
@@ -4140,7 +4149,12 @@
             <p:ph type="title"/>
           </p:nvPr>
         </p:nvSpPr>
-        <p:spPr/>
+        <p:spPr>
+          <a:xfrm>
+            <a:off x="838200" y="182619"/>
+            <a:ext cx="10515600" cy="1325563"/>
+          </a:xfrm>
+        </p:spPr>
         <p:txBody>
           <a:bodyPr/>
           <a:lstStyle/>
@@ -4152,7 +4166,7 @@
             </a:pPr>
             <a:r>
               <a:rPr lang="en-GB" dirty="0"/>
-              <a:t>Conclusion</a:t>
+              <a:t>What else can we do?</a:t>
             </a:r>
           </a:p>
         </p:txBody>
@@ -4162,7 +4176,7 @@
           <p:cNvPr id="3" name="Segnaposto contenuto 2">
             <a:extLst>
               <a:ext uri="{FF2B5EF4-FFF2-40B4-BE49-F238E27FC236}">
-                <a16:creationId xmlns:a16="http://schemas.microsoft.com/office/drawing/2014/main" id="{32E65B6D-B1B5-2244-8650-5476948E4C85}"/>
+                <a16:creationId xmlns:a16="http://schemas.microsoft.com/office/drawing/2014/main" id="{23208D79-EC64-0440-92D7-8B10863DCA54}"/>
               </a:ext>
             </a:extLst>
           </p:cNvPr>
@@ -4173,10 +4187,69 @@
             <p:ph idx="1"/>
           </p:nvPr>
         </p:nvSpPr>
-        <p:spPr/>
-        <p:txBody>
-          <a:bodyPr/>
-          <a:lstStyle/>
+        <p:spPr>
+          <a:xfrm>
+            <a:off x="838200" y="1371600"/>
+            <a:ext cx="10515600" cy="4805363"/>
+          </a:xfrm>
+        </p:spPr>
+        <p:txBody>
+          <a:bodyPr>
+            <a:normAutofit/>
+          </a:bodyPr>
+          <a:lstStyle/>
+          <a:p>
+            <a:pPr>
+              <a:lnSpc>
+                <a:spcPct val="170000"/>
+              </a:lnSpc>
+            </a:pPr>
+            <a:r>
+              <a:rPr lang="en-GB" dirty="0"/>
+              <a:t>Study input images </a:t>
+            </a:r>
+          </a:p>
+          <a:p>
+            <a:pPr lvl="1">
+              <a:lnSpc>
+                <a:spcPct val="110000"/>
+              </a:lnSpc>
+            </a:pPr>
+            <a:r>
+              <a:rPr lang="en-GB" dirty="0"/>
+              <a:t>Finding characteristics of the images to use</a:t>
+            </a:r>
+          </a:p>
+          <a:p>
+            <a:pPr lvl="1">
+              <a:lnSpc>
+                <a:spcPct val="110000"/>
+              </a:lnSpc>
+            </a:pPr>
+            <a:r>
+              <a:rPr lang="en-GB" dirty="0"/>
+              <a:t>Develop a tool to automatically study these characteristics</a:t>
+            </a:r>
+          </a:p>
+          <a:p>
+            <a:pPr lvl="1">
+              <a:lnSpc>
+                <a:spcPct val="110000"/>
+              </a:lnSpc>
+            </a:pPr>
+            <a:endParaRPr lang="en-GB" dirty="0"/>
+          </a:p>
+          <a:p>
+            <a:pPr>
+              <a:lnSpc>
+                <a:spcPct val="110000"/>
+              </a:lnSpc>
+            </a:pPr>
+            <a:r>
+              <a:rPr lang="en-GB" dirty="0"/>
+              <a:t>How can we optimize applications with this method?</a:t>
+            </a:r>
+          </a:p>
           <a:p>
             <a:pPr>
               <a:lnSpc>
@@ -4185,7 +4258,7 @@
             </a:pPr>
             <a:r>
               <a:rPr lang="en-GB" dirty="0"/>
-              <a:t>First milestone to make sugar beet recognition more efficient</a:t>
+              <a:t>Can we create contracts using these correlations?</a:t>
             </a:r>
           </a:p>
           <a:p>
@@ -4196,7 +4269,7 @@
             </a:pPr>
             <a:r>
               <a:rPr lang="en-GB" dirty="0"/>
-              <a:t>Promising research field with a lot of potential</a:t>
+              <a:t>First milestone to make sugar beet recognition more efficient</a:t>
             </a:r>
           </a:p>
           <a:p>
@@ -4209,7 +4282,7 @@
           <p:cNvPr id="4" name="Segnaposto numero diapositiva 3">
             <a:extLst>
               <a:ext uri="{FF2B5EF4-FFF2-40B4-BE49-F238E27FC236}">
-                <a16:creationId xmlns:a16="http://schemas.microsoft.com/office/drawing/2014/main" id="{66F54A01-60E6-2344-A907-1068322DC3E1}"/>
+                <a16:creationId xmlns:a16="http://schemas.microsoft.com/office/drawing/2014/main" id="{58D8FCE9-C97A-1241-8125-E8CB47BB68B7}"/>
               </a:ext>
             </a:extLst>
           </p:cNvPr>
@@ -4239,7 +4312,7 @@
           <p:cNvPr id="5" name="Segnaposto data 4">
             <a:extLst>
               <a:ext uri="{FF2B5EF4-FFF2-40B4-BE49-F238E27FC236}">
-                <a16:creationId xmlns:a16="http://schemas.microsoft.com/office/drawing/2014/main" id="{48385F9C-B851-FD48-92B6-9F26721B419E}"/>
+                <a16:creationId xmlns:a16="http://schemas.microsoft.com/office/drawing/2014/main" id="{B7414060-65B0-FD46-9987-C7A4AFFA4E58}"/>
               </a:ext>
             </a:extLst>
           </p:cNvPr>
@@ -4266,7 +4339,7 @@
     </p:spTree>
     <p:extLst>
       <p:ext uri="{BB962C8B-B14F-4D97-AF65-F5344CB8AC3E}">
-        <p14:creationId xmlns:p14="http://schemas.microsoft.com/office/powerpoint/2010/main" val="3922706667"/>
+        <p14:creationId xmlns:p14="http://schemas.microsoft.com/office/powerpoint/2010/main" val="223653232"/>
       </p:ext>
     </p:extLst>
   </p:cSld>
@@ -5194,17 +5267,6 @@
             <a:r>
               <a:rPr lang="en-GB" dirty="0"/>
               <a:t>Various studies focus on the evaluation of NNs performances</a:t>
-            </a:r>
-          </a:p>
-          <a:p>
-            <a:pPr>
-              <a:lnSpc>
-                <a:spcPct val="150000"/>
-              </a:lnSpc>
-            </a:pPr>
-            <a:r>
-              <a:rPr lang="en-GB" dirty="0"/>
-              <a:t>Not suitable for our goal</a:t>
             </a:r>
           </a:p>
         </p:txBody>

</xml_diff>